<commit_message>
Revert "Merge branch 'master' of https://github.com/ArtjomProGrammer/Voodoo"
This reverts commit 9d6ce1740eea6cce26d104d88de0b9c9d99b5f50, reversing
changes made to eeae135c8ac09f5fbd8923aaf8078cb7d9bbe676.
</commit_message>
<xml_diff>
--- a/_Organisation/Präsentation/Voodoo_PP2.pptx
+++ b/_Organisation/Präsentation/Voodoo_PP2.pptx
@@ -213,7 +213,7 @@
           <a:p>
             <a:fld id="{6970F1A7-B44C-47F4-9D4E-59C4A99A588C}" type="datetimeFigureOut">
               <a:rPr lang="de-DE" smtClean="0"/>
-              <a:t>05.07.2018</a:t>
+              <a:t>04.07.2018</a:t>
             </a:fld>
             <a:endParaRPr lang="de-DE"/>
           </a:p>
@@ -527,11 +527,19 @@
           <a:p>
             <a:r>
               <a:rPr lang="de-DE" dirty="0" smtClean="0"/>
-              <a:t>Hallo und willkommen zu Gate 2 von Doll 13, ehemalig</a:t>
+              <a:t>Hallo, mein Name ist Sonja Köck und ich bin der Producer von Team 13. Ich werde euch heute Gate 1 von unserem Projekt „Voodoo“</a:t>
             </a:r>
             <a:r>
               <a:rPr lang="de-DE" baseline="0" dirty="0" smtClean="0"/>
-              <a:t> „Voodoo“ genannt.</a:t>
+              <a:t> </a:t>
+            </a:r>
+            <a:r>
+              <a:rPr lang="de-DE" baseline="0" dirty="0" err="1" smtClean="0"/>
+              <a:t>praesentieren</a:t>
+            </a:r>
+            <a:r>
+              <a:rPr lang="de-DE" baseline="0" dirty="0" smtClean="0"/>
+              <a:t>.</a:t>
             </a:r>
             <a:endParaRPr lang="de-DE" dirty="0" smtClean="0"/>
           </a:p>
@@ -618,8 +626,12 @@
           <a:lstStyle/>
           <a:p>
             <a:r>
+              <a:rPr lang="en-US" dirty="0" smtClean="0"/>
+              <a:t>Unser Team </a:t>
+            </a:r>
+            <a:r>
               <a:rPr lang="en-US" dirty="0" err="1" smtClean="0"/>
-              <a:t>Keine</a:t>
+              <a:t>dafuer</a:t>
             </a:r>
             <a:r>
               <a:rPr lang="en-US" dirty="0" smtClean="0"/>
@@ -627,15 +639,7 @@
             </a:r>
             <a:r>
               <a:rPr lang="en-US" dirty="0" err="1" smtClean="0"/>
-              <a:t>Sorge</a:t>
-            </a:r>
-            <a:r>
-              <a:rPr lang="en-US" dirty="0" smtClean="0"/>
-              <a:t>, die </a:t>
-            </a:r>
-            <a:r>
-              <a:rPr lang="en-US" dirty="0" err="1" smtClean="0"/>
-              <a:t>Praesentation</a:t>
+              <a:t>besteht</a:t>
             </a:r>
             <a:r>
               <a:rPr lang="en-US" dirty="0" smtClean="0"/>
@@ -643,7 +647,7 @@
             </a:r>
             <a:r>
               <a:rPr lang="en-US" dirty="0" err="1" smtClean="0"/>
-              <a:t>wird</a:t>
+              <a:t>aus</a:t>
             </a:r>
             <a:r>
               <a:rPr lang="en-US" dirty="0" smtClean="0"/>
@@ -651,7 +655,147 @@
             </a:r>
             <a:r>
               <a:rPr lang="en-US" dirty="0" err="1" smtClean="0"/>
-              <a:t>kurz</a:t>
+              <a:t>unseren</a:t>
+            </a:r>
+            <a:r>
+              <a:rPr lang="en-US" dirty="0" smtClean="0"/>
+              <a:t> Artists:</a:t>
+            </a:r>
+            <a:r>
+              <a:rPr lang="en-US" baseline="0" dirty="0" smtClean="0"/>
+              <a:t> Lou, Jesse, Michelle, Levin und </a:t>
+            </a:r>
+            <a:r>
+              <a:rPr lang="en-US" baseline="0" dirty="0" err="1" smtClean="0"/>
+              <a:t>Michi</a:t>
+            </a:r>
+            <a:r>
+              <a:rPr lang="en-US" baseline="0" dirty="0" smtClean="0"/>
+              <a:t>, </a:t>
+            </a:r>
+            <a:r>
+              <a:rPr lang="en-US" baseline="0" dirty="0" err="1" smtClean="0"/>
+              <a:t>wobei</a:t>
+            </a:r>
+            <a:r>
+              <a:rPr lang="en-US" baseline="0" dirty="0" smtClean="0"/>
+              <a:t> Jesse und Michelle </a:t>
+            </a:r>
+            <a:r>
+              <a:rPr lang="en-US" baseline="0" dirty="0" err="1" smtClean="0"/>
+              <a:t>heute</a:t>
+            </a:r>
+            <a:r>
+              <a:rPr lang="en-US" baseline="0" dirty="0" smtClean="0"/>
+              <a:t> </a:t>
+            </a:r>
+            <a:r>
+              <a:rPr lang="en-US" baseline="0" dirty="0" err="1" smtClean="0"/>
+              <a:t>leider</a:t>
+            </a:r>
+            <a:r>
+              <a:rPr lang="en-US" baseline="0" dirty="0" smtClean="0"/>
+              <a:t> </a:t>
+            </a:r>
+            <a:r>
+              <a:rPr lang="en-US" baseline="0" dirty="0" err="1" smtClean="0"/>
+              <a:t>krankheitsbedingt</a:t>
+            </a:r>
+            <a:r>
+              <a:rPr lang="en-US" baseline="0" dirty="0" smtClean="0"/>
+              <a:t> </a:t>
+            </a:r>
+            <a:r>
+              <a:rPr lang="en-US" baseline="0" dirty="0" err="1" smtClean="0"/>
+              <a:t>zu</a:t>
+            </a:r>
+            <a:r>
+              <a:rPr lang="en-US" baseline="0" dirty="0" smtClean="0"/>
+              <a:t> </a:t>
+            </a:r>
+            <a:r>
+              <a:rPr lang="en-US" baseline="0" dirty="0" err="1" smtClean="0"/>
+              <a:t>Hause</a:t>
+            </a:r>
+            <a:r>
+              <a:rPr lang="en-US" baseline="0" dirty="0" smtClean="0"/>
+              <a:t> </a:t>
+            </a:r>
+            <a:r>
+              <a:rPr lang="en-US" baseline="0" dirty="0" err="1" smtClean="0"/>
+              <a:t>bleiben</a:t>
+            </a:r>
+            <a:r>
+              <a:rPr lang="en-US" baseline="0" dirty="0" smtClean="0"/>
+              <a:t> </a:t>
+            </a:r>
+            <a:r>
+              <a:rPr lang="en-US" baseline="0" dirty="0" err="1" smtClean="0"/>
+              <a:t>mussten</a:t>
+            </a:r>
+            <a:r>
+              <a:rPr lang="en-US" baseline="0" dirty="0" smtClean="0"/>
+              <a:t>. </a:t>
+            </a:r>
+            <a:r>
+              <a:rPr lang="en-US" baseline="0" dirty="0" err="1" smtClean="0"/>
+              <a:t>Weiters</a:t>
+            </a:r>
+            <a:r>
+              <a:rPr lang="en-US" baseline="0" dirty="0" smtClean="0"/>
+              <a:t> </a:t>
+            </a:r>
+            <a:r>
+              <a:rPr lang="en-US" baseline="0" dirty="0" err="1" smtClean="0"/>
+              <a:t>haben</a:t>
+            </a:r>
+            <a:r>
+              <a:rPr lang="en-US" baseline="0" dirty="0" smtClean="0"/>
+              <a:t> </a:t>
+            </a:r>
+            <a:r>
+              <a:rPr lang="en-US" baseline="0" dirty="0" err="1" smtClean="0"/>
+              <a:t>wir</a:t>
+            </a:r>
+            <a:r>
+              <a:rPr lang="en-US" baseline="0" dirty="0" smtClean="0"/>
+              <a:t> </a:t>
+            </a:r>
+            <a:r>
+              <a:rPr lang="en-US" baseline="0" dirty="0" err="1" smtClean="0"/>
+              <a:t>noch</a:t>
+            </a:r>
+            <a:r>
+              <a:rPr lang="en-US" baseline="0" dirty="0" smtClean="0"/>
+              <a:t> </a:t>
+            </a:r>
+            <a:r>
+              <a:rPr lang="en-US" baseline="0" dirty="0" err="1" smtClean="0"/>
+              <a:t>unseren</a:t>
+            </a:r>
+            <a:r>
+              <a:rPr lang="en-US" baseline="0" dirty="0" smtClean="0"/>
+              <a:t> Game Designer Tobias, </a:t>
+            </a:r>
+            <a:r>
+              <a:rPr lang="en-US" baseline="0" dirty="0" err="1" smtClean="0"/>
+              <a:t>Artjom</a:t>
+            </a:r>
+            <a:r>
+              <a:rPr lang="en-US" baseline="0" dirty="0" smtClean="0"/>
+              <a:t> </a:t>
+            </a:r>
+            <a:r>
+              <a:rPr lang="en-US" baseline="0" dirty="0" err="1" smtClean="0"/>
+              <a:t>als</a:t>
+            </a:r>
+            <a:r>
+              <a:rPr lang="en-US" baseline="0" dirty="0" smtClean="0"/>
+              <a:t> </a:t>
+            </a:r>
+            <a:r>
+              <a:rPr lang="en-US" baseline="0" dirty="0" err="1" smtClean="0"/>
+              <a:t>Programmierer</a:t>
             </a:r>
             <a:r>
               <a:rPr lang="en-US" baseline="0" dirty="0" smtClean="0"/>
@@ -659,21 +803,170 @@
             </a:r>
             <a:r>
               <a:rPr lang="en-US" baseline="0" dirty="0" err="1" smtClean="0"/>
-              <a:t>knapp</a:t>
+              <a:t>schliesslich</a:t>
+            </a:r>
+            <a:r>
+              <a:rPr lang="en-US" baseline="0" dirty="0" smtClean="0"/>
+              <a:t> </a:t>
+            </a:r>
+            <a:r>
+              <a:rPr lang="en-US" baseline="0" dirty="0" err="1" smtClean="0"/>
+              <a:t>noch</a:t>
+            </a:r>
+            <a:r>
+              <a:rPr lang="en-US" baseline="0" dirty="0" smtClean="0"/>
+              <a:t> </a:t>
+            </a:r>
+            <a:r>
+              <a:rPr lang="en-US" baseline="0" dirty="0" err="1" smtClean="0"/>
+              <a:t>mich</a:t>
+            </a:r>
+            <a:r>
+              <a:rPr lang="en-US" baseline="0" dirty="0" smtClean="0"/>
+              <a:t> </a:t>
+            </a:r>
+            <a:r>
+              <a:rPr lang="en-US" baseline="0" dirty="0" err="1" smtClean="0"/>
+              <a:t>als</a:t>
+            </a:r>
+            <a:r>
+              <a:rPr lang="en-US" baseline="0" dirty="0" smtClean="0"/>
+              <a:t> Producer.</a:t>
+            </a:r>
+            <a:br>
+              <a:rPr lang="en-US" baseline="0" dirty="0" smtClean="0"/>
+            </a:br>
+            <a:r>
+              <a:rPr lang="en-US" dirty="0" err="1" smtClean="0"/>
+              <a:t>Wir</a:t>
+            </a:r>
+            <a:r>
+              <a:rPr lang="en-US" dirty="0" smtClean="0"/>
+              <a:t> </a:t>
+            </a:r>
+            <a:r>
+              <a:rPr lang="en-US" dirty="0" err="1" smtClean="0"/>
+              <a:t>hatten</a:t>
+            </a:r>
+            <a:r>
+              <a:rPr lang="en-US" dirty="0" smtClean="0"/>
+              <a:t> </a:t>
+            </a:r>
+            <a:r>
+              <a:rPr lang="en-US" dirty="0" err="1" smtClean="0"/>
+              <a:t>anfangs</a:t>
+            </a:r>
+            <a:r>
+              <a:rPr lang="en-US" dirty="0" smtClean="0"/>
+              <a:t> </a:t>
+            </a:r>
+            <a:r>
+              <a:rPr lang="en-US" dirty="0" err="1" smtClean="0"/>
+              <a:t>Schwierigkeiten</a:t>
+            </a:r>
+            <a:r>
+              <a:rPr lang="en-US" baseline="0" dirty="0" smtClean="0"/>
+              <a:t> </a:t>
+            </a:r>
+            <a:r>
+              <a:rPr lang="en-US" baseline="0" dirty="0" err="1" smtClean="0"/>
+              <a:t>mit</a:t>
+            </a:r>
+            <a:r>
+              <a:rPr lang="en-US" baseline="0" dirty="0" smtClean="0"/>
+              <a:t> der </a:t>
+            </a:r>
+            <a:r>
+              <a:rPr lang="en-US" baseline="0" dirty="0" err="1" smtClean="0"/>
+              <a:t>Kommunikation</a:t>
+            </a:r>
+            <a:r>
+              <a:rPr lang="en-US" baseline="0" dirty="0" smtClean="0"/>
+              <a:t>, </a:t>
+            </a:r>
+            <a:r>
+              <a:rPr lang="en-US" baseline="0" dirty="0" err="1" smtClean="0"/>
+              <a:t>jedoch</a:t>
+            </a:r>
+            <a:r>
+              <a:rPr lang="en-US" baseline="0" dirty="0" smtClean="0"/>
+              <a:t> </a:t>
+            </a:r>
+            <a:r>
+              <a:rPr lang="en-US" baseline="0" dirty="0" err="1" smtClean="0"/>
+              <a:t>haben</a:t>
+            </a:r>
+            <a:r>
+              <a:rPr lang="en-US" baseline="0" dirty="0" smtClean="0"/>
+              <a:t> </a:t>
+            </a:r>
+            <a:r>
+              <a:rPr lang="en-US" baseline="0" dirty="0" err="1" smtClean="0"/>
+              <a:t>sich</a:t>
+            </a:r>
+            <a:r>
+              <a:rPr lang="en-US" baseline="0" dirty="0" smtClean="0"/>
+              <a:t> </a:t>
+            </a:r>
+            <a:r>
+              <a:rPr lang="en-US" baseline="0" dirty="0" err="1" smtClean="0"/>
+              <a:t>diese</a:t>
+            </a:r>
+            <a:r>
+              <a:rPr lang="en-US" baseline="0" dirty="0" smtClean="0"/>
+              <a:t> </a:t>
+            </a:r>
+            <a:r>
+              <a:rPr lang="en-US" baseline="0" dirty="0" err="1" smtClean="0"/>
+              <a:t>mit</a:t>
+            </a:r>
+            <a:r>
+              <a:rPr lang="en-US" baseline="0" dirty="0" smtClean="0"/>
+              <a:t> </a:t>
+            </a:r>
+            <a:r>
+              <a:rPr lang="en-US" baseline="0" dirty="0" err="1" smtClean="0"/>
+              <a:t>regelmaessigen</a:t>
+            </a:r>
+            <a:r>
+              <a:rPr lang="en-US" baseline="0" dirty="0" smtClean="0"/>
+              <a:t> </a:t>
+            </a:r>
+            <a:r>
+              <a:rPr lang="en-US" baseline="0" dirty="0" err="1" smtClean="0"/>
+              <a:t>Gespraechen</a:t>
+            </a:r>
+            <a:r>
+              <a:rPr lang="en-US" baseline="0" dirty="0" smtClean="0"/>
+              <a:t> </a:t>
+            </a:r>
+            <a:r>
+              <a:rPr lang="en-US" baseline="0" dirty="0" err="1" smtClean="0"/>
+              <a:t>zu</a:t>
+            </a:r>
+            <a:r>
+              <a:rPr lang="en-US" baseline="0" dirty="0" smtClean="0"/>
+              <a:t> ca. 80% </a:t>
+            </a:r>
+            <a:r>
+              <a:rPr lang="en-US" baseline="0" dirty="0" err="1" smtClean="0"/>
+              <a:t>klaeren</a:t>
+            </a:r>
+            <a:r>
+              <a:rPr lang="en-US" baseline="0" dirty="0" smtClean="0"/>
+              <a:t> </a:t>
+            </a:r>
+            <a:r>
+              <a:rPr lang="en-US" baseline="0" dirty="0" err="1" smtClean="0"/>
+              <a:t>lassen</a:t>
             </a:r>
             <a:r>
               <a:rPr lang="en-US" baseline="0" dirty="0" smtClean="0"/>
               <a:t>. </a:t>
             </a:r>
             <a:r>
-              <a:rPr lang="en-US" baseline="0" dirty="0" smtClean="0">
-                <a:sym typeface="Wingdings" panose="05000000000000000000" pitchFamily="2" charset="2"/>
-              </a:rPr>
-              <a:t> </a:t>
-            </a:r>
-            <a:r>
-              <a:rPr lang="en-US" dirty="0" err="1" smtClean="0"/>
-              <a:t>Ich</a:t>
+              <a:rPr lang="en-US" baseline="0" dirty="0" err="1" smtClean="0"/>
+              <a:t>Weiters</a:t>
             </a:r>
             <a:r>
               <a:rPr lang="en-US" baseline="0" dirty="0" smtClean="0"/>
@@ -681,7 +974,15 @@
             </a:r>
             <a:r>
               <a:rPr lang="en-US" baseline="0" dirty="0" err="1" smtClean="0"/>
-              <a:t>werde</a:t>
+              <a:t>hatten</a:t>
+            </a:r>
+            <a:r>
+              <a:rPr lang="en-US" baseline="0" dirty="0" smtClean="0"/>
+              <a:t> und </a:t>
+            </a:r>
+            <a:r>
+              <a:rPr lang="en-US" baseline="0" dirty="0" err="1" smtClean="0"/>
+              <a:t>haben</a:t>
             </a:r>
             <a:r>
               <a:rPr lang="en-US" baseline="0" dirty="0" smtClean="0"/>
@@ -689,7 +990,23 @@
             </a:r>
             <a:r>
               <a:rPr lang="en-US" baseline="0" dirty="0" err="1" smtClean="0"/>
-              <a:t>euch</a:t>
+              <a:t>wir</a:t>
+            </a:r>
+            <a:r>
+              <a:rPr lang="en-US" baseline="0" dirty="0" smtClean="0"/>
+              <a:t> in </a:t>
+            </a:r>
+            <a:r>
+              <a:rPr lang="en-US" baseline="0" dirty="0" err="1" smtClean="0"/>
+              <a:t>unserem</a:t>
+            </a:r>
+            <a:r>
+              <a:rPr lang="en-US" baseline="0" dirty="0" smtClean="0"/>
+              <a:t> Art-Department </a:t>
+            </a:r>
+            <a:r>
+              <a:rPr lang="en-US" baseline="0" dirty="0" err="1" smtClean="0"/>
+              <a:t>einige</a:t>
             </a:r>
             <a:r>
               <a:rPr lang="en-US" baseline="0" dirty="0" smtClean="0"/>
@@ -697,7 +1014,15 @@
             </a:r>
             <a:r>
               <a:rPr lang="en-US" baseline="0" dirty="0" err="1" smtClean="0"/>
-              <a:t>zuerst</a:t>
+              <a:t>krankheits</a:t>
+            </a:r>
+            <a:r>
+              <a:rPr lang="en-US" baseline="0" dirty="0" smtClean="0"/>
+              <a:t>- und </a:t>
+            </a:r>
+            <a:r>
+              <a:rPr lang="en-US" baseline="0" dirty="0" err="1" smtClean="0"/>
+              <a:t>durch</a:t>
             </a:r>
             <a:r>
               <a:rPr lang="en-US" baseline="0" dirty="0" smtClean="0"/>
@@ -705,7 +1030,7 @@
             </a:r>
             <a:r>
               <a:rPr lang="en-US" baseline="0" dirty="0" err="1" smtClean="0"/>
-              <a:t>ein</a:t>
+              <a:t>anderweitige</a:t>
             </a:r>
             <a:r>
               <a:rPr lang="en-US" baseline="0" dirty="0" smtClean="0"/>
@@ -713,11 +1038,334 @@
             </a:r>
             <a:r>
               <a:rPr lang="en-US" baseline="0" dirty="0" err="1" smtClean="0"/>
-              <a:t>kleines</a:t>
-            </a:r>
-            <a:r>
-              <a:rPr lang="en-US" baseline="0" dirty="0" smtClean="0"/>
-              <a:t> Review </a:t>
+              <a:t>Arbeit</a:t>
+            </a:r>
+            <a:r>
+              <a:rPr lang="en-US" baseline="0" dirty="0" smtClean="0"/>
+              <a:t> </a:t>
+            </a:r>
+            <a:r>
+              <a:rPr lang="en-US" baseline="0" dirty="0" err="1" smtClean="0"/>
+              <a:t>bedingte</a:t>
+            </a:r>
+            <a:r>
+              <a:rPr lang="en-US" baseline="0" dirty="0" smtClean="0"/>
+              <a:t> </a:t>
+            </a:r>
+            <a:r>
+              <a:rPr lang="en-US" baseline="0" dirty="0" err="1" smtClean="0"/>
+              <a:t>Ausfaelle</a:t>
+            </a:r>
+            <a:r>
+              <a:rPr lang="en-US" baseline="0" dirty="0" smtClean="0"/>
+              <a:t>, </a:t>
+            </a:r>
+            <a:r>
+              <a:rPr lang="en-US" baseline="0" dirty="0" err="1" smtClean="0"/>
+              <a:t>wie</a:t>
+            </a:r>
+            <a:r>
+              <a:rPr lang="en-US" baseline="0" dirty="0" smtClean="0"/>
+              <a:t> </a:t>
+            </a:r>
+            <a:r>
+              <a:rPr lang="en-US" baseline="0" dirty="0" err="1" smtClean="0"/>
+              <a:t>heute</a:t>
+            </a:r>
+            <a:r>
+              <a:rPr lang="en-US" baseline="0" dirty="0" smtClean="0"/>
+              <a:t> </a:t>
+            </a:r>
+            <a:r>
+              <a:rPr lang="en-US" baseline="0" dirty="0" err="1" smtClean="0"/>
+              <a:t>zum</a:t>
+            </a:r>
+            <a:r>
+              <a:rPr lang="en-US" baseline="0" dirty="0" smtClean="0"/>
+              <a:t> </a:t>
+            </a:r>
+            <a:r>
+              <a:rPr lang="en-US" baseline="0" dirty="0" err="1" smtClean="0"/>
+              <a:t>Beispiel</a:t>
+            </a:r>
+            <a:r>
+              <a:rPr lang="en-US" baseline="0" dirty="0" smtClean="0"/>
+              <a:t> von Michelle und Jesse. </a:t>
+            </a:r>
+            <a:r>
+              <a:rPr lang="en-US" baseline="0" dirty="0" err="1" smtClean="0"/>
+              <a:t>Ausserdem</a:t>
+            </a:r>
+            <a:r>
+              <a:rPr lang="en-US" baseline="0" dirty="0" smtClean="0"/>
+              <a:t> </a:t>
+            </a:r>
+            <a:r>
+              <a:rPr lang="en-US" baseline="0" dirty="0" err="1" smtClean="0"/>
+              <a:t>wird</a:t>
+            </a:r>
+            <a:r>
+              <a:rPr lang="en-US" baseline="0" dirty="0" smtClean="0"/>
+              <a:t> </a:t>
+            </a:r>
+            <a:r>
+              <a:rPr lang="en-US" baseline="0" dirty="0" err="1" smtClean="0"/>
+              <a:t>unsere</a:t>
+            </a:r>
+            <a:r>
+              <a:rPr lang="en-US" baseline="0" dirty="0" smtClean="0"/>
+              <a:t> </a:t>
+            </a:r>
+            <a:r>
+              <a:rPr lang="en-US" baseline="0" dirty="0" err="1" smtClean="0"/>
+              <a:t>Animatorin</a:t>
+            </a:r>
+            <a:r>
+              <a:rPr lang="en-US" baseline="0" dirty="0" smtClean="0"/>
+              <a:t> </a:t>
+            </a:r>
+            <a:r>
+              <a:rPr lang="en-US" baseline="0" dirty="0" err="1" smtClean="0"/>
+              <a:t>Michi</a:t>
+            </a:r>
+            <a:r>
+              <a:rPr lang="en-US" baseline="0" dirty="0" smtClean="0"/>
+              <a:t> </a:t>
+            </a:r>
+            <a:r>
+              <a:rPr lang="en-US" baseline="0" dirty="0" err="1" smtClean="0"/>
+              <a:t>noch</a:t>
+            </a:r>
+            <a:r>
+              <a:rPr lang="en-US" baseline="0" dirty="0" smtClean="0"/>
+              <a:t> </a:t>
+            </a:r>
+            <a:r>
+              <a:rPr lang="en-US" baseline="0" dirty="0" err="1" smtClean="0"/>
+              <a:t>fuer</a:t>
+            </a:r>
+            <a:r>
+              <a:rPr lang="en-US" baseline="0" dirty="0" smtClean="0"/>
+              <a:t> </a:t>
+            </a:r>
+            <a:r>
+              <a:rPr lang="en-US" baseline="0" dirty="0" err="1" smtClean="0"/>
+              <a:t>weitere</a:t>
+            </a:r>
+            <a:r>
+              <a:rPr lang="en-US" baseline="0" dirty="0" smtClean="0"/>
+              <a:t> 3 </a:t>
+            </a:r>
+            <a:r>
+              <a:rPr lang="en-US" baseline="0" dirty="0" err="1" smtClean="0"/>
+              <a:t>Wochen</a:t>
+            </a:r>
+            <a:r>
+              <a:rPr lang="en-US" baseline="0" dirty="0" smtClean="0"/>
+              <a:t> von Metric Minds </a:t>
+            </a:r>
+            <a:r>
+              <a:rPr lang="en-US" baseline="0" dirty="0" err="1" smtClean="0"/>
+              <a:t>beanschlagt</a:t>
+            </a:r>
+            <a:r>
+              <a:rPr lang="en-US" baseline="0" dirty="0" smtClean="0"/>
+              <a:t>. </a:t>
+            </a:r>
+            <a:r>
+              <a:rPr lang="en-US" baseline="0" dirty="0" err="1" smtClean="0"/>
+              <a:t>Diese</a:t>
+            </a:r>
+            <a:r>
+              <a:rPr lang="en-US" baseline="0" dirty="0" smtClean="0"/>
+              <a:t> </a:t>
+            </a:r>
+            <a:r>
+              <a:rPr lang="en-US" baseline="0" dirty="0" err="1" smtClean="0"/>
+              <a:t>Ausfaelle</a:t>
+            </a:r>
+            <a:r>
+              <a:rPr lang="en-US" baseline="0" dirty="0" smtClean="0"/>
+              <a:t> </a:t>
+            </a:r>
+            <a:r>
+              <a:rPr lang="en-US" baseline="0" dirty="0" err="1" smtClean="0"/>
+              <a:t>halten</a:t>
+            </a:r>
+            <a:r>
+              <a:rPr lang="en-US" baseline="0" dirty="0" smtClean="0"/>
+              <a:t> </a:t>
+            </a:r>
+            <a:r>
+              <a:rPr lang="en-US" baseline="0" dirty="0" err="1" smtClean="0"/>
+              <a:t>sich</a:t>
+            </a:r>
+            <a:r>
+              <a:rPr lang="en-US" baseline="0" dirty="0" smtClean="0"/>
+              <a:t>  </a:t>
+            </a:r>
+            <a:r>
+              <a:rPr lang="en-US" baseline="0" dirty="0" err="1" smtClean="0"/>
+              <a:t>aber</a:t>
+            </a:r>
+            <a:r>
+              <a:rPr lang="en-US" baseline="0" dirty="0" smtClean="0"/>
+              <a:t> </a:t>
+            </a:r>
+            <a:r>
+              <a:rPr lang="en-US" baseline="0" dirty="0" err="1" smtClean="0"/>
+              <a:t>bisher</a:t>
+            </a:r>
+            <a:r>
+              <a:rPr lang="en-US" baseline="0" dirty="0" smtClean="0"/>
+              <a:t> </a:t>
+            </a:r>
+            <a:r>
+              <a:rPr lang="en-US" baseline="0" dirty="0" err="1" smtClean="0"/>
+              <a:t>noch</a:t>
+            </a:r>
+            <a:r>
+              <a:rPr lang="en-US" baseline="0" dirty="0" smtClean="0"/>
+              <a:t> in </a:t>
+            </a:r>
+            <a:r>
+              <a:rPr lang="en-US" baseline="0" dirty="0" err="1" smtClean="0"/>
+              <a:t>einem</a:t>
+            </a:r>
+            <a:r>
+              <a:rPr lang="en-US" baseline="0" dirty="0" smtClean="0"/>
+              <a:t> </a:t>
+            </a:r>
+            <a:r>
+              <a:rPr lang="en-US" baseline="0" dirty="0" err="1" smtClean="0"/>
+              <a:t>zuvor</a:t>
+            </a:r>
+            <a:r>
+              <a:rPr lang="en-US" baseline="0" dirty="0" smtClean="0"/>
+              <a:t> </a:t>
+            </a:r>
+            <a:r>
+              <a:rPr lang="en-US" baseline="0" dirty="0" err="1" smtClean="0"/>
+              <a:t>miteingerechneten</a:t>
+            </a:r>
+            <a:r>
+              <a:rPr lang="en-US" baseline="0" dirty="0" smtClean="0"/>
+              <a:t> </a:t>
+            </a:r>
+            <a:r>
+              <a:rPr lang="en-US" baseline="0" dirty="0" err="1" smtClean="0"/>
+              <a:t>Rahmen</a:t>
+            </a:r>
+            <a:r>
+              <a:rPr lang="en-US" baseline="0" dirty="0" smtClean="0"/>
+              <a:t> und </a:t>
+            </a:r>
+            <a:r>
+              <a:rPr lang="en-US" baseline="0" dirty="0" err="1" smtClean="0"/>
+              <a:t>sollten</a:t>
+            </a:r>
+            <a:r>
+              <a:rPr lang="en-US" baseline="0" dirty="0" smtClean="0"/>
+              <a:t> </a:t>
+            </a:r>
+            <a:r>
+              <a:rPr lang="en-US" baseline="0" dirty="0" err="1" smtClean="0"/>
+              <a:t>somit</a:t>
+            </a:r>
+            <a:r>
+              <a:rPr lang="en-US" baseline="0" dirty="0" smtClean="0"/>
+              <a:t> </a:t>
+            </a:r>
+            <a:r>
+              <a:rPr lang="en-US" baseline="0" dirty="0" err="1" smtClean="0"/>
+              <a:t>keine</a:t>
+            </a:r>
+            <a:r>
+              <a:rPr lang="en-US" baseline="0" dirty="0" smtClean="0"/>
+              <a:t> </a:t>
+            </a:r>
+            <a:r>
+              <a:rPr lang="en-US" baseline="0" dirty="0" err="1" smtClean="0"/>
+              <a:t>allzu</a:t>
+            </a:r>
+            <a:r>
+              <a:rPr lang="en-US" baseline="0" dirty="0" smtClean="0"/>
+              <a:t> negative </a:t>
+            </a:r>
+            <a:r>
+              <a:rPr lang="en-US" baseline="0" dirty="0" err="1" smtClean="0"/>
+              <a:t>Auswirkungen</a:t>
+            </a:r>
+            <a:r>
+              <a:rPr lang="en-US" baseline="0" dirty="0" smtClean="0"/>
+              <a:t> auf </a:t>
+            </a:r>
+            <a:r>
+              <a:rPr lang="en-US" baseline="0" dirty="0" err="1" smtClean="0"/>
+              <a:t>unsere</a:t>
+            </a:r>
+            <a:r>
+              <a:rPr lang="en-US" baseline="0" dirty="0" smtClean="0"/>
+              <a:t> </a:t>
+            </a:r>
+            <a:r>
+              <a:rPr lang="en-US" baseline="0" dirty="0" err="1" smtClean="0"/>
+              <a:t>Produktion</a:t>
+            </a:r>
+            <a:r>
+              <a:rPr lang="en-US" baseline="0" dirty="0" smtClean="0"/>
+              <a:t> </a:t>
+            </a:r>
+            <a:r>
+              <a:rPr lang="en-US" baseline="0" dirty="0" err="1" smtClean="0"/>
+              <a:t>haben</a:t>
+            </a:r>
+            <a:r>
+              <a:rPr lang="en-US" baseline="0" dirty="0" smtClean="0"/>
+              <a:t>. </a:t>
+            </a:r>
+            <a:br>
+              <a:rPr lang="en-US" baseline="0" dirty="0" smtClean="0"/>
+            </a:br>
+            <a:r>
+              <a:rPr lang="en-US" baseline="0" dirty="0" err="1" smtClean="0"/>
+              <a:t>Damit</a:t>
+            </a:r>
+            <a:r>
+              <a:rPr lang="en-US" baseline="0" dirty="0" smtClean="0"/>
+              <a:t> </a:t>
+            </a:r>
+            <a:r>
+              <a:rPr lang="en-US" baseline="0" dirty="0" err="1" smtClean="0"/>
+              <a:t>kommen</a:t>
+            </a:r>
+            <a:r>
+              <a:rPr lang="en-US" baseline="0" dirty="0" smtClean="0"/>
+              <a:t> </a:t>
+            </a:r>
+            <a:r>
+              <a:rPr lang="en-US" baseline="0" dirty="0" err="1" smtClean="0"/>
+              <a:t>wir</a:t>
+            </a:r>
+            <a:r>
+              <a:rPr lang="en-US" baseline="0" dirty="0" smtClean="0"/>
+              <a:t> </a:t>
+            </a:r>
+            <a:r>
+              <a:rPr lang="en-US" baseline="0" dirty="0" err="1" smtClean="0"/>
+              <a:t>dann</a:t>
+            </a:r>
+            <a:r>
+              <a:rPr lang="en-US" baseline="0" dirty="0" smtClean="0"/>
+              <a:t> </a:t>
+            </a:r>
+            <a:r>
+              <a:rPr lang="en-US" baseline="0" dirty="0" err="1" smtClean="0"/>
+              <a:t>auch</a:t>
+            </a:r>
+            <a:r>
+              <a:rPr lang="en-US" baseline="0" dirty="0" smtClean="0"/>
+              <a:t> direct </a:t>
             </a:r>
             <a:r>
               <a:rPr lang="en-US" baseline="0" dirty="0" err="1" smtClean="0"/>
@@ -729,23 +1377,7 @@
             </a:r>
             <a:r>
               <a:rPr lang="en-US" baseline="0" dirty="0" err="1" smtClean="0"/>
-              <a:t>dem</a:t>
-            </a:r>
-            <a:r>
-              <a:rPr lang="en-US" baseline="0" dirty="0" smtClean="0"/>
-              <a:t> Spiel und </a:t>
-            </a:r>
-            <a:r>
-              <a:rPr lang="en-US" baseline="0" dirty="0" err="1" smtClean="0"/>
-              <a:t>unserer</a:t>
-            </a:r>
-            <a:r>
-              <a:rPr lang="en-US" baseline="0" dirty="0" smtClean="0"/>
-              <a:t> Vision </a:t>
-            </a:r>
-            <a:r>
-              <a:rPr lang="en-US" baseline="0" dirty="0" err="1" smtClean="0"/>
-              <a:t>dazu</a:t>
+              <a:t>unseren</a:t>
             </a:r>
             <a:r>
               <a:rPr lang="en-US" baseline="0" dirty="0" smtClean="0"/>
@@ -753,15 +1385,15 @@
             </a:r>
             <a:r>
               <a:rPr lang="en-US" baseline="0" dirty="0" err="1" smtClean="0"/>
-              <a:t>geben</a:t>
-            </a:r>
-            <a:r>
-              <a:rPr lang="en-US" baseline="0" dirty="0" smtClean="0"/>
-              <a:t> und </a:t>
-            </a:r>
-            <a:r>
-              <a:rPr lang="en-US" baseline="0" dirty="0" err="1" smtClean="0"/>
-              <a:t>anschliessend</a:t>
+              <a:t>Zielen</a:t>
+            </a:r>
+            <a:r>
+              <a:rPr lang="en-US" baseline="0" dirty="0" smtClean="0"/>
+              <a:t>, die </a:t>
+            </a:r>
+            <a:r>
+              <a:rPr lang="en-US" baseline="0" dirty="0" err="1" smtClean="0"/>
+              <a:t>wir</a:t>
             </a:r>
             <a:r>
               <a:rPr lang="en-US" baseline="0" dirty="0" smtClean="0"/>
@@ -769,15 +1401,7 @@
             </a:r>
             <a:r>
               <a:rPr lang="en-US" baseline="0" dirty="0" err="1" smtClean="0"/>
-              <a:t>auffuehren</a:t>
-            </a:r>
-            <a:r>
-              <a:rPr lang="en-US" baseline="0" dirty="0" smtClean="0"/>
-              <a:t>, was </a:t>
-            </a:r>
-            <a:r>
-              <a:rPr lang="en-US" baseline="0" dirty="0" err="1" smtClean="0"/>
-              <a:t>wir</a:t>
+              <a:t>uns</a:t>
             </a:r>
             <a:r>
               <a:rPr lang="en-US" baseline="0" dirty="0" smtClean="0"/>
@@ -785,7 +1409,15 @@
             </a:r>
             <a:r>
               <a:rPr lang="en-US" baseline="0" dirty="0" err="1" smtClean="0"/>
-              <a:t>euch</a:t>
+              <a:t>fuer</a:t>
+            </a:r>
+            <a:r>
+              <a:rPr lang="en-US" baseline="0" dirty="0" smtClean="0"/>
+              <a:t> gate 1 </a:t>
+            </a:r>
+            <a:r>
+              <a:rPr lang="en-US" baseline="0" dirty="0" err="1" smtClean="0"/>
+              <a:t>gesaetzt</a:t>
             </a:r>
             <a:r>
               <a:rPr lang="en-US" baseline="0" dirty="0" smtClean="0"/>
@@ -793,251 +1425,11 @@
             </a:r>
             <a:r>
               <a:rPr lang="en-US" baseline="0" dirty="0" err="1" smtClean="0"/>
-              <a:t>bis</a:t>
-            </a:r>
-            <a:r>
-              <a:rPr lang="en-US" baseline="0" dirty="0" smtClean="0"/>
-              <a:t> </a:t>
-            </a:r>
-            <a:r>
-              <a:rPr lang="en-US" baseline="0" dirty="0" err="1" smtClean="0"/>
-              <a:t>heute</a:t>
-            </a:r>
-            <a:r>
-              <a:rPr lang="en-US" baseline="0" dirty="0" smtClean="0"/>
-              <a:t> </a:t>
-            </a:r>
-            <a:r>
-              <a:rPr lang="en-US" baseline="0" dirty="0" err="1" smtClean="0"/>
-              <a:t>versprochen</a:t>
-            </a:r>
-            <a:r>
-              <a:rPr lang="en-US" baseline="0" dirty="0" smtClean="0"/>
-              <a:t> </a:t>
-            </a:r>
-            <a:r>
-              <a:rPr lang="en-US" baseline="0" dirty="0" err="1" smtClean="0"/>
-              <a:t>haben</a:t>
-            </a:r>
-            <a:r>
-              <a:rPr lang="en-US" baseline="0" dirty="0" smtClean="0"/>
-              <a:t> und </a:t>
-            </a:r>
-            <a:r>
-              <a:rPr lang="en-US" baseline="0" dirty="0" err="1" smtClean="0"/>
-              <a:t>wie</a:t>
-            </a:r>
-            <a:r>
-              <a:rPr lang="en-US" baseline="0" dirty="0" smtClean="0"/>
-              <a:t> </a:t>
-            </a:r>
-            <a:r>
-              <a:rPr lang="en-US" baseline="0" dirty="0" err="1" smtClean="0"/>
-              <a:t>weit</a:t>
-            </a:r>
-            <a:r>
-              <a:rPr lang="en-US" baseline="0" dirty="0" smtClean="0"/>
-              <a:t> </a:t>
-            </a:r>
-            <a:r>
-              <a:rPr lang="en-US" baseline="0" dirty="0" err="1" smtClean="0"/>
-              <a:t>wir</a:t>
-            </a:r>
-            <a:r>
-              <a:rPr lang="en-US" baseline="0" dirty="0" smtClean="0"/>
-              <a:t> </a:t>
-            </a:r>
-            <a:r>
-              <a:rPr lang="en-US" baseline="0" dirty="0" err="1" smtClean="0"/>
-              <a:t>tatsaechlich</a:t>
-            </a:r>
-            <a:r>
-              <a:rPr lang="en-US" baseline="0" dirty="0" smtClean="0"/>
-              <a:t> </a:t>
-            </a:r>
-            <a:r>
-              <a:rPr lang="en-US" baseline="0" dirty="0" err="1" smtClean="0"/>
-              <a:t>gekommen</a:t>
-            </a:r>
-            <a:r>
-              <a:rPr lang="en-US" baseline="0" dirty="0" smtClean="0"/>
-              <a:t> </a:t>
-            </a:r>
-            <a:r>
-              <a:rPr lang="en-US" baseline="0" dirty="0" err="1" smtClean="0"/>
-              <a:t>sind</a:t>
-            </a:r>
-            <a:r>
-              <a:rPr lang="en-US" baseline="0" dirty="0" smtClean="0"/>
-              <a:t>. </a:t>
-            </a:r>
-            <a:r>
-              <a:rPr lang="en-US" baseline="0" dirty="0" err="1" smtClean="0"/>
-              <a:t>Danach</a:t>
-            </a:r>
-            <a:r>
-              <a:rPr lang="en-US" baseline="0" dirty="0" smtClean="0"/>
-              <a:t> </a:t>
-            </a:r>
-            <a:r>
-              <a:rPr lang="en-US" baseline="0" dirty="0" err="1" smtClean="0"/>
-              <a:t>kommen</a:t>
-            </a:r>
-            <a:r>
-              <a:rPr lang="en-US" baseline="0" dirty="0" smtClean="0"/>
-              <a:t> </a:t>
-            </a:r>
-            <a:r>
-              <a:rPr lang="en-US" baseline="0" dirty="0" err="1" smtClean="0"/>
-              <a:t>wir</a:t>
-            </a:r>
-            <a:r>
-              <a:rPr lang="en-US" baseline="0" dirty="0" smtClean="0"/>
-              <a:t> </a:t>
-            </a:r>
-            <a:r>
-              <a:rPr lang="en-US" baseline="0" dirty="0" err="1" smtClean="0"/>
-              <a:t>zu</a:t>
-            </a:r>
-            <a:r>
-              <a:rPr lang="en-US" baseline="0" dirty="0" smtClean="0"/>
-              <a:t> den </a:t>
-            </a:r>
-            <a:r>
-              <a:rPr lang="en-US" baseline="0" dirty="0" err="1" smtClean="0"/>
-              <a:t>Zielen</a:t>
-            </a:r>
-            <a:r>
-              <a:rPr lang="en-US" baseline="0" dirty="0" smtClean="0"/>
-              <a:t> die </a:t>
-            </a:r>
-            <a:r>
-              <a:rPr lang="en-US" baseline="0" dirty="0" err="1" smtClean="0"/>
-              <a:t>wir</a:t>
-            </a:r>
-            <a:r>
-              <a:rPr lang="en-US" baseline="0" dirty="0" smtClean="0"/>
-              <a:t> </a:t>
-            </a:r>
-            <a:r>
-              <a:rPr lang="en-US" baseline="0" dirty="0" err="1" smtClean="0"/>
-              <a:t>uns</a:t>
-            </a:r>
-            <a:r>
-              <a:rPr lang="en-US" baseline="0" dirty="0" smtClean="0"/>
-              <a:t> </a:t>
-            </a:r>
-            <a:r>
-              <a:rPr lang="en-US" baseline="0" dirty="0" err="1" smtClean="0"/>
-              <a:t>bis</a:t>
-            </a:r>
-            <a:r>
-              <a:rPr lang="en-US" baseline="0" dirty="0" smtClean="0"/>
-              <a:t> </a:t>
-            </a:r>
-            <a:r>
-              <a:rPr lang="en-US" baseline="0" dirty="0" err="1" smtClean="0"/>
-              <a:t>zum</a:t>
-            </a:r>
-            <a:r>
-              <a:rPr lang="en-US" baseline="0" dirty="0" smtClean="0"/>
-              <a:t> </a:t>
-            </a:r>
-            <a:r>
-              <a:rPr lang="en-US" baseline="0" dirty="0" err="1" smtClean="0"/>
-              <a:t>Goldmaster</a:t>
-            </a:r>
-            <a:r>
-              <a:rPr lang="en-US" baseline="0" dirty="0" smtClean="0"/>
-              <a:t> </a:t>
-            </a:r>
-            <a:r>
-              <a:rPr lang="en-US" baseline="0" dirty="0" err="1" smtClean="0"/>
-              <a:t>gesetzt</a:t>
-            </a:r>
-            <a:r>
-              <a:rPr lang="en-US" baseline="0" dirty="0" smtClean="0"/>
-              <a:t> </a:t>
-            </a:r>
-            <a:r>
-              <a:rPr lang="en-US" baseline="0" dirty="0" err="1" smtClean="0"/>
-              <a:t>haben</a:t>
-            </a:r>
-            <a:r>
-              <a:rPr lang="en-US" baseline="0" dirty="0" smtClean="0"/>
-              <a:t> und </a:t>
-            </a:r>
-            <a:r>
-              <a:rPr lang="en-US" baseline="0" dirty="0" err="1" smtClean="0"/>
-              <a:t>dann</a:t>
-            </a:r>
-            <a:r>
-              <a:rPr lang="en-US" baseline="0" dirty="0" smtClean="0"/>
-              <a:t> </a:t>
-            </a:r>
-            <a:r>
-              <a:rPr lang="en-US" baseline="0" dirty="0" err="1" smtClean="0"/>
-              <a:t>zeigen</a:t>
-            </a:r>
-            <a:r>
-              <a:rPr lang="en-US" baseline="0" dirty="0" smtClean="0"/>
-              <a:t> </a:t>
-            </a:r>
-            <a:r>
-              <a:rPr lang="en-US" baseline="0" dirty="0" err="1" smtClean="0"/>
-              <a:t>wir</a:t>
-            </a:r>
-            <a:r>
-              <a:rPr lang="en-US" baseline="0" dirty="0" smtClean="0"/>
-              <a:t> </a:t>
-            </a:r>
-            <a:r>
-              <a:rPr lang="en-US" baseline="0" dirty="0" err="1" smtClean="0"/>
-              <a:t>euch</a:t>
-            </a:r>
-            <a:r>
-              <a:rPr lang="en-US" baseline="0" dirty="0" smtClean="0"/>
-              <a:t> </a:t>
-            </a:r>
-            <a:r>
-              <a:rPr lang="en-US" baseline="0" dirty="0" err="1" smtClean="0"/>
-              <a:t>auch</a:t>
-            </a:r>
-            <a:r>
-              <a:rPr lang="en-US" baseline="0" dirty="0" smtClean="0"/>
-              <a:t> </a:t>
-            </a:r>
-            <a:r>
-              <a:rPr lang="en-US" baseline="0" dirty="0" err="1" smtClean="0"/>
-              <a:t>schhon</a:t>
-            </a:r>
-            <a:r>
-              <a:rPr lang="en-US" baseline="0" dirty="0" smtClean="0"/>
-              <a:t> direct das Spiel </a:t>
-            </a:r>
-            <a:r>
-              <a:rPr lang="en-US" baseline="0" dirty="0" err="1" smtClean="0"/>
-              <a:t>selbst</a:t>
-            </a:r>
-            <a:r>
-              <a:rPr lang="en-US" baseline="0" dirty="0" smtClean="0"/>
-              <a:t> auf </a:t>
-            </a:r>
-            <a:r>
-              <a:rPr lang="en-US" baseline="0" dirty="0" err="1" smtClean="0"/>
-              <a:t>dem</a:t>
-            </a:r>
-            <a:r>
-              <a:rPr lang="en-US" baseline="0" dirty="0" smtClean="0"/>
-              <a:t> </a:t>
-            </a:r>
-            <a:r>
-              <a:rPr lang="en-US" baseline="0" dirty="0" err="1" smtClean="0"/>
-              <a:t>jetzigen</a:t>
-            </a:r>
-            <a:r>
-              <a:rPr lang="en-US" baseline="0" dirty="0" smtClean="0"/>
-              <a:t> Stand. </a:t>
+              <a:t>hatten</a:t>
+            </a:r>
+            <a:r>
+              <a:rPr lang="en-US" baseline="0" dirty="0" smtClean="0"/>
+              <a:t>.</a:t>
             </a:r>
             <a:endParaRPr lang="de-DE" dirty="0"/>
           </a:p>
@@ -1124,56 +1516,76 @@
           <a:lstStyle/>
           <a:p>
             <a:r>
-              <a:rPr lang="en-US" baseline="0" dirty="0" err="1" smtClean="0"/>
-              <a:t>Wie</a:t>
-            </a:r>
-            <a:r>
-              <a:rPr lang="en-US" baseline="0" dirty="0" smtClean="0"/>
+              <a:rPr lang="en-US" dirty="0" err="1" smtClean="0"/>
+              <a:t>Zuerst</a:t>
+            </a:r>
+            <a:r>
+              <a:rPr lang="en-US" dirty="0" smtClean="0"/>
               <a:t> </a:t>
             </a:r>
             <a:r>
-              <a:rPr lang="en-US" baseline="0" dirty="0" err="1" smtClean="0"/>
-              <a:t>gerade</a:t>
-            </a:r>
-            <a:r>
-              <a:rPr lang="en-US" baseline="0" dirty="0" smtClean="0"/>
+              <a:rPr lang="en-US" dirty="0" err="1" smtClean="0"/>
+              <a:t>allerdings</a:t>
+            </a:r>
+            <a:r>
+              <a:rPr lang="en-US" dirty="0" smtClean="0"/>
               <a:t> </a:t>
             </a:r>
             <a:r>
-              <a:rPr lang="en-US" baseline="0" dirty="0" err="1" smtClean="0"/>
-              <a:t>versprochen</a:t>
-            </a:r>
-            <a:r>
-              <a:rPr lang="en-US" baseline="0" dirty="0" smtClean="0"/>
-              <a:t>, </a:t>
-            </a:r>
-            <a:r>
-              <a:rPr lang="en-US" baseline="0" dirty="0" err="1" smtClean="0"/>
-              <a:t>zuerst</a:t>
-            </a:r>
-            <a:r>
-              <a:rPr lang="en-US" baseline="0" dirty="0" smtClean="0"/>
+              <a:rPr lang="en-US" dirty="0" err="1" smtClean="0"/>
+              <a:t>ein</a:t>
+            </a:r>
+            <a:r>
+              <a:rPr lang="en-US" dirty="0" smtClean="0"/>
               <a:t> </a:t>
             </a:r>
             <a:r>
+              <a:rPr lang="en-US" dirty="0" err="1" smtClean="0"/>
+              <a:t>kleines</a:t>
+            </a:r>
+            <a:r>
+              <a:rPr lang="en-US" dirty="0" smtClean="0"/>
+              <a:t> Review.</a:t>
+            </a:r>
+            <a:r>
+              <a:rPr lang="en-US" baseline="0" dirty="0" smtClean="0"/>
+              <a:t>  Voodoo </a:t>
+            </a:r>
+            <a:r>
+              <a:rPr lang="en-US" baseline="0" dirty="0" err="1" smtClean="0"/>
+              <a:t>ist</a:t>
+            </a:r>
+            <a:r>
+              <a:rPr lang="en-US" baseline="0" dirty="0" smtClean="0"/>
+              <a:t> </a:t>
+            </a:r>
+            <a:r>
               <a:rPr lang="en-US" baseline="0" dirty="0" err="1" smtClean="0"/>
               <a:t>ein</a:t>
             </a:r>
             <a:r>
               <a:rPr lang="en-US" baseline="0" dirty="0" smtClean="0"/>
+              <a:t> 3D platformer </a:t>
+            </a:r>
+            <a:r>
+              <a:rPr lang="en-US" baseline="0" dirty="0" err="1" smtClean="0"/>
+              <a:t>fuer</a:t>
+            </a:r>
+            <a:r>
+              <a:rPr lang="en-US" baseline="0" dirty="0" smtClean="0"/>
               <a:t> </a:t>
             </a:r>
             <a:r>
               <a:rPr lang="en-US" baseline="0" dirty="0" err="1" smtClean="0"/>
-              <a:t>kleines</a:t>
-            </a:r>
-            <a:r>
-              <a:rPr lang="en-US" baseline="0" dirty="0" smtClean="0"/>
-              <a:t> Review. Doll 13 </a:t>
-            </a:r>
-            <a:r>
-              <a:rPr lang="en-US" baseline="0" dirty="0" err="1" smtClean="0"/>
-              <a:t>ist</a:t>
+              <a:t>Freunde</a:t>
+            </a:r>
+            <a:r>
+              <a:rPr lang="en-US" baseline="0" dirty="0" smtClean="0"/>
+              <a:t> des </a:t>
+            </a:r>
+            <a:r>
+              <a:rPr lang="en-US" baseline="0" dirty="0" err="1" smtClean="0"/>
+              <a:t>Okkulten</a:t>
             </a:r>
             <a:r>
               <a:rPr lang="en-US" baseline="0" dirty="0" smtClean="0"/>
@@ -1181,35 +1593,87 @@
             </a:r>
             <a:r>
               <a:rPr lang="en-US" baseline="0" dirty="0" err="1" smtClean="0"/>
+              <a:t>mit</a:t>
+            </a:r>
+            <a:r>
+              <a:rPr lang="en-US" baseline="0" dirty="0" smtClean="0"/>
+              <a:t> </a:t>
+            </a:r>
+            <a:r>
+              <a:rPr lang="en-US" baseline="0" dirty="0" err="1" smtClean="0"/>
+              <a:t>einigen</a:t>
+            </a:r>
+            <a:r>
+              <a:rPr lang="en-US" baseline="0" dirty="0" smtClean="0"/>
+              <a:t> Stealth und Puzzle-</a:t>
+            </a:r>
+            <a:r>
+              <a:rPr lang="en-US" baseline="0" dirty="0" err="1" smtClean="0"/>
+              <a:t>Elementen</a:t>
+            </a:r>
+            <a:r>
+              <a:rPr lang="en-US" baseline="0" dirty="0" smtClean="0"/>
+              <a:t>. </a:t>
+            </a:r>
+            <a:r>
+              <a:rPr lang="en-US" baseline="0" dirty="0" err="1" smtClean="0"/>
+              <a:t>Es</a:t>
+            </a:r>
+            <a:r>
+              <a:rPr lang="en-US" baseline="0" dirty="0" smtClean="0"/>
+              <a:t> </a:t>
+            </a:r>
+            <a:r>
+              <a:rPr lang="en-US" baseline="0" dirty="0" err="1" smtClean="0"/>
+              <a:t>handelt</a:t>
+            </a:r>
+            <a:r>
+              <a:rPr lang="en-US" baseline="0" dirty="0" smtClean="0"/>
+              <a:t> </a:t>
+            </a:r>
+            <a:r>
+              <a:rPr lang="en-US" baseline="0" dirty="0" err="1" smtClean="0"/>
+              <a:t>sich</a:t>
+            </a:r>
+            <a:r>
+              <a:rPr lang="en-US" baseline="0" dirty="0" smtClean="0"/>
+              <a:t> um </a:t>
+            </a:r>
+            <a:r>
+              <a:rPr lang="en-US" baseline="0" dirty="0" err="1" smtClean="0"/>
               <a:t>ein</a:t>
             </a:r>
             <a:r>
               <a:rPr lang="en-US" baseline="0" dirty="0" smtClean="0"/>
-              <a:t> 3D </a:t>
-            </a:r>
-            <a:r>
-              <a:rPr lang="en-US" baseline="0" dirty="0" smtClean="0"/>
-              <a:t>puzzle-adventure </a:t>
-            </a:r>
-            <a:r>
-              <a:rPr lang="en-US" baseline="0" dirty="0" err="1" smtClean="0"/>
-              <a:t>mit</a:t>
-            </a:r>
-            <a:r>
-              <a:rPr lang="en-US" baseline="0" dirty="0" smtClean="0"/>
               <a:t> </a:t>
             </a:r>
             <a:r>
               <a:rPr lang="en-US" baseline="0" dirty="0" err="1" smtClean="0"/>
-              <a:t>einigen</a:t>
-            </a:r>
-            <a:r>
-              <a:rPr lang="en-US" baseline="0" dirty="0" smtClean="0"/>
-              <a:t> Stealth-</a:t>
-            </a:r>
-            <a:r>
-              <a:rPr lang="en-US" baseline="0" dirty="0" err="1" smtClean="0"/>
-              <a:t>Elementen</a:t>
+              <a:t>Singelplayer</a:t>
+            </a:r>
+            <a:r>
+              <a:rPr lang="en-US" baseline="0" dirty="0" smtClean="0"/>
+              <a:t>-Spiel, welches </a:t>
+            </a:r>
+            <a:r>
+              <a:rPr lang="en-US" baseline="0" dirty="0" err="1" smtClean="0"/>
+              <a:t>wir</a:t>
+            </a:r>
+            <a:r>
+              <a:rPr lang="en-US" baseline="0" dirty="0" smtClean="0"/>
+              <a:t> in Unity </a:t>
+            </a:r>
+            <a:r>
+              <a:rPr lang="en-US" baseline="0" dirty="0" err="1" smtClean="0"/>
+              <a:t>fuer</a:t>
+            </a:r>
+            <a:r>
+              <a:rPr lang="en-US" baseline="0" dirty="0" smtClean="0"/>
+              <a:t> den PC </a:t>
+            </a:r>
+            <a:r>
+              <a:rPr lang="en-US" baseline="0" dirty="0" err="1" smtClean="0"/>
+              <a:t>erstellt</a:t>
             </a:r>
             <a:r>
               <a:rPr lang="en-US" baseline="0" dirty="0" smtClean="0"/>
@@ -1217,402 +1681,11 @@
             </a:r>
             <a:r>
               <a:rPr lang="en-US" baseline="0" dirty="0" err="1" smtClean="0"/>
-              <a:t>fuer</a:t>
-            </a:r>
-            <a:r>
-              <a:rPr lang="en-US" baseline="0" dirty="0" smtClean="0"/>
-              <a:t> </a:t>
-            </a:r>
-            <a:r>
-              <a:rPr lang="en-US" baseline="0" dirty="0" err="1" smtClean="0"/>
-              <a:t>Freunde</a:t>
-            </a:r>
-            <a:r>
-              <a:rPr lang="en-US" baseline="0" dirty="0" smtClean="0"/>
-              <a:t> des </a:t>
-            </a:r>
-            <a:r>
-              <a:rPr lang="en-US" baseline="0" dirty="0" err="1" smtClean="0"/>
-              <a:t>Okkulten</a:t>
+              <a:t>haben</a:t>
             </a:r>
             <a:r>
               <a:rPr lang="en-US" baseline="0" dirty="0" smtClean="0"/>
               <a:t>. </a:t>
-            </a:r>
-            <a:r>
-              <a:rPr lang="en-US" baseline="0" dirty="0" err="1" smtClean="0"/>
-              <a:t>Es</a:t>
-            </a:r>
-            <a:r>
-              <a:rPr lang="en-US" baseline="0" dirty="0" smtClean="0"/>
-              <a:t> </a:t>
-            </a:r>
-            <a:r>
-              <a:rPr lang="en-US" baseline="0" dirty="0" err="1" smtClean="0"/>
-              <a:t>ist</a:t>
-            </a:r>
-            <a:r>
-              <a:rPr lang="en-US" baseline="0" dirty="0" smtClean="0"/>
-              <a:t> </a:t>
-            </a:r>
-            <a:r>
-              <a:rPr lang="en-US" baseline="0" dirty="0" err="1" smtClean="0"/>
-              <a:t>ein</a:t>
-            </a:r>
-            <a:r>
-              <a:rPr lang="en-US" baseline="0" dirty="0" smtClean="0"/>
-              <a:t> </a:t>
-            </a:r>
-            <a:r>
-              <a:rPr lang="en-US" baseline="0" dirty="0" err="1" smtClean="0"/>
-              <a:t>Singelplayer</a:t>
-            </a:r>
-            <a:r>
-              <a:rPr lang="en-US" baseline="0" dirty="0" smtClean="0"/>
-              <a:t>-Spiel </a:t>
-            </a:r>
-            <a:r>
-              <a:rPr lang="en-US" baseline="0" dirty="0" err="1" smtClean="0"/>
-              <a:t>fuer</a:t>
-            </a:r>
-            <a:r>
-              <a:rPr lang="en-US" baseline="0" dirty="0" smtClean="0"/>
-              <a:t> den PC, in </a:t>
-            </a:r>
-            <a:r>
-              <a:rPr lang="en-US" baseline="0" dirty="0" err="1" smtClean="0"/>
-              <a:t>dem</a:t>
-            </a:r>
-            <a:r>
-              <a:rPr lang="en-US" baseline="0" dirty="0" smtClean="0"/>
-              <a:t> man </a:t>
-            </a:r>
-            <a:r>
-              <a:rPr lang="en-US" baseline="0" dirty="0" err="1" smtClean="0"/>
-              <a:t>eine</a:t>
-            </a:r>
-            <a:r>
-              <a:rPr lang="en-US" baseline="0" dirty="0" smtClean="0"/>
-              <a:t> </a:t>
-            </a:r>
-            <a:r>
-              <a:rPr lang="en-US" baseline="0" dirty="0" err="1" smtClean="0"/>
-              <a:t>kleine</a:t>
-            </a:r>
-            <a:r>
-              <a:rPr lang="en-US" baseline="0" dirty="0" smtClean="0"/>
-              <a:t> Voodoo-</a:t>
-            </a:r>
-            <a:r>
-              <a:rPr lang="en-US" baseline="0" dirty="0" err="1" smtClean="0"/>
-              <a:t>Puppe</a:t>
-            </a:r>
-            <a:r>
-              <a:rPr lang="en-US" baseline="0" dirty="0" smtClean="0"/>
-              <a:t> </a:t>
-            </a:r>
-            <a:r>
-              <a:rPr lang="en-US" baseline="0" dirty="0" err="1" smtClean="0"/>
-              <a:t>spielt</a:t>
-            </a:r>
-            <a:r>
-              <a:rPr lang="en-US" baseline="0" dirty="0" smtClean="0"/>
-              <a:t>, die </a:t>
-            </a:r>
-            <a:r>
-              <a:rPr lang="en-US" baseline="0" dirty="0" err="1" smtClean="0"/>
-              <a:t>versucht</a:t>
-            </a:r>
-            <a:r>
-              <a:rPr lang="en-US" baseline="0" dirty="0" smtClean="0"/>
-              <a:t>, </a:t>
-            </a:r>
-            <a:r>
-              <a:rPr lang="en-US" baseline="0" dirty="0" err="1" smtClean="0"/>
-              <a:t>mit</a:t>
-            </a:r>
-            <a:r>
-              <a:rPr lang="en-US" baseline="0" dirty="0" smtClean="0"/>
-              <a:t> </a:t>
-            </a:r>
-            <a:r>
-              <a:rPr lang="en-US" baseline="0" dirty="0" err="1" smtClean="0"/>
-              <a:t>Hilfe</a:t>
-            </a:r>
-            <a:r>
-              <a:rPr lang="en-US" baseline="0" dirty="0" smtClean="0"/>
-              <a:t> von Voodoo-</a:t>
-            </a:r>
-            <a:r>
-              <a:rPr lang="en-US" baseline="0" dirty="0" err="1" smtClean="0"/>
-              <a:t>Kaeften</a:t>
-            </a:r>
-            <a:r>
-              <a:rPr lang="en-US" baseline="0" dirty="0" smtClean="0"/>
-              <a:t>,  </a:t>
-            </a:r>
-            <a:r>
-              <a:rPr lang="en-US" baseline="0" dirty="0" err="1" smtClean="0"/>
-              <a:t>aus</a:t>
-            </a:r>
-            <a:r>
-              <a:rPr lang="en-US" baseline="0" dirty="0" smtClean="0"/>
-              <a:t> </a:t>
-            </a:r>
-            <a:r>
-              <a:rPr lang="en-US" baseline="0" dirty="0" err="1" smtClean="0"/>
-              <a:t>dem</a:t>
-            </a:r>
-            <a:r>
-              <a:rPr lang="en-US" baseline="0" dirty="0" smtClean="0"/>
-              <a:t> Keller </a:t>
-            </a:r>
-            <a:r>
-              <a:rPr lang="en-US" baseline="0" dirty="0" err="1" smtClean="0"/>
-              <a:t>einer</a:t>
-            </a:r>
-            <a:r>
-              <a:rPr lang="en-US" baseline="0" dirty="0" smtClean="0"/>
-              <a:t> </a:t>
-            </a:r>
-            <a:r>
-              <a:rPr lang="en-US" baseline="0" dirty="0" err="1" smtClean="0"/>
-              <a:t>Geheimgesellschaft</a:t>
-            </a:r>
-            <a:r>
-              <a:rPr lang="en-US" baseline="0" dirty="0" smtClean="0"/>
-              <a:t> </a:t>
-            </a:r>
-            <a:r>
-              <a:rPr lang="en-US" baseline="0" dirty="0" err="1" smtClean="0"/>
-              <a:t>zu</a:t>
-            </a:r>
-            <a:r>
-              <a:rPr lang="en-US" baseline="0" dirty="0" smtClean="0"/>
-              <a:t> </a:t>
-            </a:r>
-            <a:r>
-              <a:rPr lang="en-US" baseline="0" dirty="0" err="1" smtClean="0"/>
-              <a:t>entkommen</a:t>
-            </a:r>
-            <a:r>
-              <a:rPr lang="en-US" baseline="0" dirty="0" smtClean="0"/>
-              <a:t>. Das </a:t>
-            </a:r>
-            <a:r>
-              <a:rPr lang="en-US" baseline="0" dirty="0" err="1" smtClean="0"/>
-              <a:t>Ganze</a:t>
-            </a:r>
-            <a:r>
-              <a:rPr lang="en-US" baseline="0" dirty="0" smtClean="0"/>
-              <a:t> </a:t>
-            </a:r>
-            <a:r>
-              <a:rPr lang="en-US" baseline="0" dirty="0" err="1" smtClean="0"/>
-              <a:t>ereignet</a:t>
-            </a:r>
-            <a:r>
-              <a:rPr lang="en-US" baseline="0" dirty="0" smtClean="0"/>
-              <a:t> </a:t>
-            </a:r>
-            <a:r>
-              <a:rPr lang="en-US" baseline="0" dirty="0" err="1" smtClean="0"/>
-              <a:t>sich</a:t>
-            </a:r>
-            <a:r>
-              <a:rPr lang="en-US" baseline="0" dirty="0" smtClean="0"/>
-              <a:t> in den 1950ern und </a:t>
-            </a:r>
-            <a:r>
-              <a:rPr lang="en-US" baseline="0" dirty="0" err="1" smtClean="0"/>
-              <a:t>unser</a:t>
-            </a:r>
-            <a:r>
-              <a:rPr lang="en-US" baseline="0" dirty="0" smtClean="0"/>
-              <a:t> </a:t>
-            </a:r>
-            <a:r>
-              <a:rPr lang="en-US" baseline="0" dirty="0" err="1" smtClean="0"/>
-              <a:t>Ziel</a:t>
-            </a:r>
-            <a:r>
-              <a:rPr lang="en-US" baseline="0" dirty="0" smtClean="0"/>
-              <a:t> </a:t>
-            </a:r>
-            <a:r>
-              <a:rPr lang="en-US" baseline="0" dirty="0" err="1" smtClean="0"/>
-              <a:t>ist</a:t>
-            </a:r>
-            <a:r>
-              <a:rPr lang="en-US" baseline="0" dirty="0" smtClean="0"/>
-              <a:t> </a:t>
-            </a:r>
-            <a:r>
-              <a:rPr lang="en-US" baseline="0" dirty="0" err="1" smtClean="0"/>
-              <a:t>es</a:t>
-            </a:r>
-            <a:r>
-              <a:rPr lang="en-US" baseline="0" dirty="0" smtClean="0"/>
-              <a:t> </a:t>
-            </a:r>
-            <a:r>
-              <a:rPr lang="en-US" baseline="0" dirty="0" err="1" smtClean="0"/>
-              <a:t>mit</a:t>
-            </a:r>
-            <a:r>
-              <a:rPr lang="en-US" baseline="0" dirty="0" smtClean="0"/>
-              <a:t> </a:t>
-            </a:r>
-            <a:r>
-              <a:rPr lang="en-US" baseline="0" dirty="0" err="1" smtClean="0"/>
-              <a:t>Hilfe</a:t>
-            </a:r>
-            <a:r>
-              <a:rPr lang="en-US" baseline="0" dirty="0" smtClean="0"/>
-              <a:t> von Environmental Storytelling den </a:t>
-            </a:r>
-            <a:r>
-              <a:rPr lang="en-US" baseline="0" dirty="0" err="1" smtClean="0"/>
-              <a:t>Spieler</a:t>
-            </a:r>
-            <a:r>
-              <a:rPr lang="en-US" baseline="0" dirty="0" smtClean="0"/>
-              <a:t> die </a:t>
-            </a:r>
-            <a:r>
-              <a:rPr lang="en-US" baseline="0" dirty="0" err="1" smtClean="0"/>
-              <a:t>Hintergrundgeschichte</a:t>
-            </a:r>
-            <a:r>
-              <a:rPr lang="en-US" baseline="0" dirty="0" smtClean="0"/>
-              <a:t> </a:t>
-            </a:r>
-            <a:r>
-              <a:rPr lang="en-US" baseline="0" dirty="0" err="1" smtClean="0"/>
-              <a:t>waehrend</a:t>
-            </a:r>
-            <a:r>
-              <a:rPr lang="en-US" baseline="0" dirty="0" smtClean="0"/>
-              <a:t> des Spiels </a:t>
-            </a:r>
-            <a:r>
-              <a:rPr lang="en-US" baseline="0" dirty="0" err="1" smtClean="0"/>
-              <a:t>entdecken</a:t>
-            </a:r>
-            <a:r>
-              <a:rPr lang="en-US" baseline="0" dirty="0" smtClean="0"/>
-              <a:t> </a:t>
-            </a:r>
-            <a:r>
-              <a:rPr lang="en-US" baseline="0" dirty="0" err="1" smtClean="0"/>
-              <a:t>zu</a:t>
-            </a:r>
-            <a:r>
-              <a:rPr lang="en-US" baseline="0" dirty="0" smtClean="0"/>
-              <a:t> </a:t>
-            </a:r>
-            <a:r>
-              <a:rPr lang="en-US" baseline="0" dirty="0" err="1" smtClean="0"/>
-              <a:t>lassen</a:t>
-            </a:r>
-            <a:r>
-              <a:rPr lang="en-US" baseline="0" dirty="0" smtClean="0"/>
-              <a:t>.</a:t>
-            </a:r>
-            <a:br>
-              <a:rPr lang="en-US" baseline="0" dirty="0" smtClean="0"/>
-            </a:br>
-            <a:r>
-              <a:rPr lang="en-US" baseline="0" dirty="0" smtClean="0"/>
-              <a:t>So </a:t>
-            </a:r>
-            <a:r>
-              <a:rPr lang="en-US" baseline="0" dirty="0" err="1" smtClean="0"/>
-              <a:t>weit</a:t>
-            </a:r>
-            <a:r>
-              <a:rPr lang="en-US" baseline="0" dirty="0" smtClean="0"/>
-              <a:t>, so gut, </a:t>
-            </a:r>
-            <a:r>
-              <a:rPr lang="en-US" baseline="0" dirty="0" err="1" smtClean="0"/>
-              <a:t>kommen</a:t>
-            </a:r>
-            <a:r>
-              <a:rPr lang="en-US" baseline="0" dirty="0" smtClean="0"/>
-              <a:t> </a:t>
-            </a:r>
-            <a:r>
-              <a:rPr lang="en-US" baseline="0" dirty="0" err="1" smtClean="0"/>
-              <a:t>wir</a:t>
-            </a:r>
-            <a:r>
-              <a:rPr lang="en-US" baseline="0" dirty="0" smtClean="0"/>
-              <a:t> nun </a:t>
-            </a:r>
-            <a:r>
-              <a:rPr lang="en-US" baseline="0" dirty="0" err="1" smtClean="0"/>
-              <a:t>zu</a:t>
-            </a:r>
-            <a:r>
-              <a:rPr lang="en-US" baseline="0" dirty="0" smtClean="0"/>
-              <a:t> </a:t>
-            </a:r>
-            <a:r>
-              <a:rPr lang="en-US" baseline="0" dirty="0" err="1" smtClean="0"/>
-              <a:t>dem</a:t>
-            </a:r>
-            <a:r>
-              <a:rPr lang="en-US" baseline="0" dirty="0" smtClean="0"/>
-              <a:t>, was </a:t>
-            </a:r>
-            <a:r>
-              <a:rPr lang="en-US" baseline="0" dirty="0" err="1" smtClean="0"/>
-              <a:t>wir</a:t>
-            </a:r>
-            <a:r>
-              <a:rPr lang="en-US" baseline="0" dirty="0" smtClean="0"/>
-              <a:t> </a:t>
-            </a:r>
-            <a:r>
-              <a:rPr lang="en-US" baseline="0" dirty="0" err="1" smtClean="0"/>
-              <a:t>euch</a:t>
-            </a:r>
-            <a:r>
-              <a:rPr lang="en-US" baseline="0" dirty="0" smtClean="0"/>
-              <a:t> </a:t>
-            </a:r>
-            <a:r>
-              <a:rPr lang="en-US" baseline="0" dirty="0" err="1" smtClean="0"/>
-              <a:t>bis</a:t>
-            </a:r>
-            <a:r>
-              <a:rPr lang="en-US" baseline="0" dirty="0" smtClean="0"/>
-              <a:t> </a:t>
-            </a:r>
-            <a:r>
-              <a:rPr lang="en-US" baseline="0" dirty="0" err="1" smtClean="0"/>
-              <a:t>heute</a:t>
-            </a:r>
-            <a:r>
-              <a:rPr lang="en-US" baseline="0" dirty="0" smtClean="0"/>
-              <a:t> </a:t>
-            </a:r>
-            <a:r>
-              <a:rPr lang="en-US" baseline="0" dirty="0" err="1" smtClean="0"/>
-              <a:t>versprochen</a:t>
-            </a:r>
-            <a:r>
-              <a:rPr lang="en-US" baseline="0" dirty="0" smtClean="0"/>
-              <a:t> </a:t>
-            </a:r>
-            <a:r>
-              <a:rPr lang="en-US" baseline="0" dirty="0" err="1" smtClean="0"/>
-              <a:t>haben</a:t>
-            </a:r>
-            <a:r>
-              <a:rPr lang="en-US" baseline="0" dirty="0" smtClean="0"/>
-              <a:t>:</a:t>
             </a:r>
             <a:endParaRPr lang="de-DE" dirty="0"/>
           </a:p>
@@ -1708,7 +1781,7 @@
             </a:r>
             <a:r>
               <a:rPr lang="en-US" dirty="0" err="1" smtClean="0"/>
-              <a:t>haben</a:t>
+              <a:t>hatten</a:t>
             </a:r>
             <a:r>
               <a:rPr lang="en-US" dirty="0" smtClean="0"/>
@@ -1716,7 +1789,7 @@
             </a:r>
             <a:r>
               <a:rPr lang="en-US" dirty="0" err="1" smtClean="0"/>
-              <a:t>euch</a:t>
+              <a:t>versprochen</a:t>
             </a:r>
             <a:r>
               <a:rPr lang="en-US" dirty="0" smtClean="0"/>
@@ -1724,7 +1797,7 @@
             </a:r>
             <a:r>
               <a:rPr lang="en-US" dirty="0" err="1" smtClean="0"/>
-              <a:t>ein</a:t>
+              <a:t>heute</a:t>
             </a:r>
             <a:r>
               <a:rPr lang="en-US" dirty="0" smtClean="0"/>
@@ -1732,19 +1805,51 @@
             </a:r>
             <a:r>
               <a:rPr lang="en-US" dirty="0" err="1" smtClean="0"/>
-              <a:t>zweites</a:t>
+              <a:t>einen</a:t>
             </a:r>
             <a:r>
               <a:rPr lang="en-US" dirty="0" smtClean="0"/>
-              <a:t> Level, das Labor, </a:t>
+              <a:t> </a:t>
             </a:r>
             <a:r>
               <a:rPr lang="en-US" dirty="0" err="1" smtClean="0"/>
-              <a:t>versprochen</a:t>
+              <a:t>spielbaren</a:t>
             </a:r>
             <a:r>
               <a:rPr lang="en-US" dirty="0" smtClean="0"/>
-              <a:t> und dieses warden </a:t>
+              <a:t> </a:t>
+            </a:r>
+            <a:r>
+              <a:rPr lang="en-US" dirty="0" err="1" smtClean="0"/>
+              <a:t>Prototypen</a:t>
+            </a:r>
+            <a:r>
+              <a:rPr lang="en-US" dirty="0" smtClean="0"/>
+              <a:t> </a:t>
+            </a:r>
+            <a:r>
+              <a:rPr lang="en-US" dirty="0" err="1" smtClean="0"/>
+              <a:t>vorzustellen</a:t>
+            </a:r>
+            <a:r>
+              <a:rPr lang="en-US" dirty="0" smtClean="0"/>
+              <a:t>, </a:t>
+            </a:r>
+            <a:r>
+              <a:rPr lang="en-US" dirty="0" err="1" smtClean="0"/>
+              <a:t>zu</a:t>
+            </a:r>
+            <a:r>
+              <a:rPr lang="en-US" dirty="0" smtClean="0"/>
+              <a:t> </a:t>
+            </a:r>
+            <a:r>
+              <a:rPr lang="en-US" dirty="0" err="1" smtClean="0"/>
+              <a:t>dem</a:t>
+            </a:r>
+            <a:r>
+              <a:rPr lang="en-US" dirty="0" smtClean="0"/>
+              <a:t> </a:t>
             </a:r>
             <a:r>
               <a:rPr lang="en-US" dirty="0" err="1" smtClean="0"/>
@@ -1756,7 +1861,7 @@
             </a:r>
             <a:r>
               <a:rPr lang="en-US" dirty="0" err="1" smtClean="0"/>
-              <a:t>euch</a:t>
+              <a:t>auch</a:t>
             </a:r>
             <a:r>
               <a:rPr lang="en-US" dirty="0" smtClean="0"/>
@@ -1764,7 +1869,7 @@
             </a:r>
             <a:r>
               <a:rPr lang="en-US" dirty="0" err="1" smtClean="0"/>
-              <a:t>heute</a:t>
+              <a:t>gleich</a:t>
             </a:r>
             <a:r>
               <a:rPr lang="en-US" dirty="0" smtClean="0"/>
@@ -1772,7 +1877,15 @@
             </a:r>
             <a:r>
               <a:rPr lang="en-US" dirty="0" err="1" smtClean="0"/>
-              <a:t>auch</a:t>
+              <a:t>kommen</a:t>
+            </a:r>
+            <a:r>
+              <a:rPr lang="en-US" dirty="0" smtClean="0"/>
+              <a:t>. </a:t>
+            </a:r>
+            <a:r>
+              <a:rPr lang="en-US" dirty="0" err="1" smtClean="0"/>
+              <a:t>Ausserdem</a:t>
             </a:r>
             <a:r>
               <a:rPr lang="en-US" dirty="0" smtClean="0"/>
@@ -1788,15 +1901,7 @@
             </a:r>
             <a:r>
               <a:rPr lang="en-US" dirty="0" err="1" smtClean="0"/>
-              <a:t>koennen</a:t>
-            </a:r>
-            <a:r>
-              <a:rPr lang="en-US" dirty="0" smtClean="0"/>
-              <a:t>. </a:t>
-            </a:r>
-            <a:r>
-              <a:rPr lang="en-US" dirty="0" err="1" smtClean="0"/>
-              <a:t>Zudem</a:t>
+              <a:t>wir</a:t>
             </a:r>
             <a:r>
               <a:rPr lang="en-US" dirty="0" smtClean="0"/>
@@ -1804,7 +1909,7 @@
             </a:r>
             <a:r>
               <a:rPr lang="en-US" dirty="0" err="1" smtClean="0"/>
-              <a:t>haben</a:t>
+              <a:t>euch</a:t>
             </a:r>
             <a:r>
               <a:rPr lang="en-US" dirty="0" smtClean="0"/>
@@ -1812,703 +1917,111 @@
             </a:r>
             <a:r>
               <a:rPr lang="en-US" dirty="0" err="1" smtClean="0"/>
+              <a:t>unseren</a:t>
+            </a:r>
+            <a:r>
+              <a:rPr lang="en-US" dirty="0" smtClean="0"/>
+              <a:t> </a:t>
+            </a:r>
+            <a:r>
+              <a:rPr lang="en-US" dirty="0" err="1" smtClean="0"/>
+              <a:t>bereits</a:t>
+            </a:r>
+            <a:r>
+              <a:rPr lang="en-US" dirty="0" smtClean="0"/>
+              <a:t> </a:t>
+            </a:r>
+            <a:r>
+              <a:rPr lang="en-US" dirty="0" err="1" smtClean="0"/>
+              <a:t>texturierten</a:t>
+            </a:r>
+            <a:r>
+              <a:rPr lang="en-US" dirty="0" smtClean="0"/>
+              <a:t> </a:t>
+            </a:r>
+            <a:r>
+              <a:rPr lang="en-US" dirty="0" err="1" smtClean="0"/>
+              <a:t>Hauptcharakter</a:t>
+            </a:r>
+            <a:r>
+              <a:rPr lang="en-US" dirty="0" smtClean="0"/>
+              <a:t>,</a:t>
+            </a:r>
+            <a:r>
+              <a:rPr lang="en-US" baseline="0" dirty="0" smtClean="0"/>
+              <a:t> </a:t>
+            </a:r>
+            <a:r>
+              <a:rPr lang="en-US" baseline="0" dirty="0" err="1" smtClean="0"/>
+              <a:t>sowie</a:t>
+            </a:r>
+            <a:r>
+              <a:rPr lang="en-US" baseline="0" dirty="0" smtClean="0"/>
+              <a:t> </a:t>
+            </a:r>
+            <a:r>
+              <a:rPr lang="en-US" baseline="0" dirty="0" err="1" smtClean="0"/>
+              <a:t>unsere</a:t>
+            </a:r>
+            <a:r>
+              <a:rPr lang="en-US" baseline="0" dirty="0" smtClean="0"/>
+              <a:t> </a:t>
+            </a:r>
+            <a:r>
+              <a:rPr lang="en-US" baseline="0" dirty="0" err="1" smtClean="0"/>
+              <a:t>erste</a:t>
+            </a:r>
+            <a:r>
+              <a:rPr lang="en-US" baseline="0" dirty="0" smtClean="0"/>
+              <a:t> </a:t>
+            </a:r>
+            <a:r>
+              <a:rPr lang="en-US" baseline="0" dirty="0" err="1" smtClean="0"/>
+              <a:t>Mechanik</a:t>
+            </a:r>
+            <a:r>
+              <a:rPr lang="en-US" baseline="0" dirty="0" smtClean="0"/>
+              <a:t>: Clairvoyance. Am </a:t>
+            </a:r>
+            <a:r>
+              <a:rPr lang="en-US" baseline="0" dirty="0" err="1" smtClean="0"/>
+              <a:t>besten</a:t>
+            </a:r>
+            <a:r>
+              <a:rPr lang="en-US" baseline="0" dirty="0" smtClean="0"/>
+              <a:t> </a:t>
+            </a:r>
+            <a:r>
+              <a:rPr lang="en-US" baseline="0" dirty="0" err="1" smtClean="0"/>
+              <a:t>sehen</a:t>
+            </a:r>
+            <a:r>
+              <a:rPr lang="en-US" baseline="0" dirty="0" smtClean="0"/>
+              <a:t> </a:t>
+            </a:r>
+            <a:r>
+              <a:rPr lang="en-US" baseline="0" dirty="0" err="1" smtClean="0"/>
               <a:t>wir</a:t>
             </a:r>
             <a:r>
-              <a:rPr lang="en-US" dirty="0" smtClean="0"/>
-              <a:t> das </a:t>
-            </a:r>
-            <a:r>
-              <a:rPr lang="en-US" dirty="0" err="1" smtClean="0"/>
-              <a:t>erste</a:t>
-            </a:r>
-            <a:r>
-              <a:rPr lang="en-US" dirty="0" smtClean="0"/>
-              <a:t> Level, das </a:t>
-            </a:r>
-            <a:r>
-              <a:rPr lang="en-US" dirty="0" err="1" smtClean="0"/>
-              <a:t>Buero</a:t>
-            </a:r>
-            <a:r>
-              <a:rPr lang="en-US" dirty="0" smtClean="0"/>
-              <a:t>, </a:t>
-            </a:r>
-            <a:r>
-              <a:rPr lang="en-US" dirty="0" err="1" smtClean="0"/>
-              <a:t>ebenfalls</a:t>
-            </a:r>
-            <a:r>
               <a:rPr lang="en-US" baseline="0" dirty="0" smtClean="0"/>
               <a:t> </a:t>
             </a:r>
             <a:r>
               <a:rPr lang="en-US" baseline="0" dirty="0" err="1" smtClean="0"/>
-              <a:t>eingerichtet</a:t>
-            </a:r>
-            <a:r>
-              <a:rPr lang="en-US" baseline="0" dirty="0" smtClean="0"/>
-              <a:t> und </a:t>
-            </a:r>
-            <a:r>
-              <a:rPr lang="en-US" baseline="0" dirty="0" err="1" smtClean="0"/>
-              <a:t>werden</a:t>
-            </a:r>
-            <a:r>
-              <a:rPr lang="en-US" baseline="0" dirty="0" smtClean="0"/>
-              <a:t> </a:t>
-            </a:r>
-            <a:r>
-              <a:rPr lang="en-US" baseline="0" dirty="0" err="1" smtClean="0"/>
-              <a:t>unser</a:t>
-            </a:r>
-            <a:r>
-              <a:rPr lang="en-US" baseline="0" dirty="0" smtClean="0"/>
-              <a:t> Spiel </a:t>
-            </a:r>
-            <a:r>
-              <a:rPr lang="en-US" baseline="0" dirty="0" err="1" smtClean="0"/>
-              <a:t>heute</a:t>
-            </a:r>
-            <a:r>
-              <a:rPr lang="en-US" baseline="0" dirty="0" smtClean="0"/>
-              <a:t> </a:t>
-            </a:r>
-            <a:r>
-              <a:rPr lang="en-US" baseline="0" dirty="0" err="1" smtClean="0"/>
-              <a:t>auch</a:t>
-            </a:r>
-            <a:r>
-              <a:rPr lang="en-US" baseline="0" dirty="0" smtClean="0"/>
-              <a:t> von </a:t>
-            </a:r>
-            <a:r>
-              <a:rPr lang="en-US" baseline="0" dirty="0" err="1" smtClean="0"/>
-              <a:t>dort</a:t>
-            </a:r>
-            <a:r>
-              <a:rPr lang="en-US" baseline="0" dirty="0" smtClean="0"/>
-              <a:t> </a:t>
-            </a:r>
-            <a:r>
-              <a:rPr lang="en-US" baseline="0" dirty="0" err="1" smtClean="0"/>
-              <a:t>aus</a:t>
-            </a:r>
-            <a:r>
-              <a:rPr lang="en-US" baseline="0" dirty="0" smtClean="0"/>
-              <a:t> </a:t>
-            </a:r>
-            <a:r>
-              <a:rPr lang="en-US" baseline="0" dirty="0" err="1" smtClean="0"/>
-              <a:t>starten</a:t>
-            </a:r>
-            <a:r>
-              <a:rPr lang="en-US" baseline="0" dirty="0" smtClean="0"/>
-              <a:t>, </a:t>
-            </a:r>
-            <a:r>
-              <a:rPr lang="en-US" baseline="0" dirty="0" err="1" smtClean="0"/>
-              <a:t>damit</a:t>
-            </a:r>
-            <a:r>
-              <a:rPr lang="en-US" baseline="0" dirty="0" smtClean="0"/>
-              <a:t> </a:t>
-            </a:r>
-            <a:r>
-              <a:rPr lang="en-US" baseline="0" dirty="0" err="1" smtClean="0"/>
-              <a:t>ihr</a:t>
-            </a:r>
-            <a:r>
-              <a:rPr lang="en-US" baseline="0" dirty="0" smtClean="0"/>
-              <a:t> </a:t>
-            </a:r>
-            <a:r>
-              <a:rPr lang="en-US" baseline="0" dirty="0" err="1" smtClean="0"/>
-              <a:t>ein</a:t>
-            </a:r>
-            <a:r>
-              <a:rPr lang="en-US" baseline="0" dirty="0" smtClean="0"/>
-              <a:t> </a:t>
-            </a:r>
-            <a:r>
-              <a:rPr lang="en-US" baseline="0" dirty="0" err="1" smtClean="0"/>
-              <a:t>wenig</a:t>
-            </a:r>
-            <a:r>
-              <a:rPr lang="en-US" baseline="0" dirty="0" smtClean="0"/>
-              <a:t> </a:t>
-            </a:r>
-            <a:r>
-              <a:rPr lang="en-US" baseline="0" dirty="0" err="1" smtClean="0"/>
-              <a:t>mehr</a:t>
-            </a:r>
-            <a:r>
-              <a:rPr lang="en-US" baseline="0" dirty="0" smtClean="0"/>
-              <a:t> </a:t>
-            </a:r>
-            <a:r>
-              <a:rPr lang="en-US" baseline="0" dirty="0" err="1" smtClean="0"/>
-              <a:t>Einblick</a:t>
-            </a:r>
-            <a:r>
-              <a:rPr lang="en-US" baseline="0" dirty="0" smtClean="0"/>
-              <a:t> </a:t>
-            </a:r>
-            <a:r>
-              <a:rPr lang="en-US" baseline="0" dirty="0" err="1" smtClean="0"/>
-              <a:t>bekommt</a:t>
-            </a:r>
-            <a:r>
-              <a:rPr lang="en-US" baseline="0" dirty="0" smtClean="0"/>
-              <a:t>.</a:t>
-            </a:r>
-            <a:br>
-              <a:rPr lang="en-US" baseline="0" dirty="0" smtClean="0"/>
-            </a:br>
-            <a:r>
-              <a:rPr lang="en-US" baseline="0" dirty="0" err="1" smtClean="0"/>
-              <a:t>Wir</a:t>
-            </a:r>
-            <a:r>
-              <a:rPr lang="en-US" baseline="0" dirty="0" smtClean="0"/>
-              <a:t> </a:t>
-            </a:r>
-            <a:r>
-              <a:rPr lang="en-US" baseline="0" dirty="0" err="1" smtClean="0"/>
-              <a:t>haben</a:t>
-            </a:r>
-            <a:r>
-              <a:rPr lang="en-US" baseline="0" dirty="0" smtClean="0"/>
-              <a:t> </a:t>
-            </a:r>
-            <a:r>
-              <a:rPr lang="en-US" baseline="0" dirty="0" err="1" smtClean="0"/>
-              <a:t>euch</a:t>
-            </a:r>
-            <a:r>
-              <a:rPr lang="en-US" baseline="0" dirty="0" smtClean="0"/>
-              <a:t> </a:t>
-            </a:r>
-            <a:r>
-              <a:rPr lang="en-US" baseline="0" dirty="0" err="1" smtClean="0"/>
-              <a:t>ebenfalls</a:t>
-            </a:r>
-            <a:r>
-              <a:rPr lang="en-US" baseline="0" dirty="0" smtClean="0"/>
-              <a:t> </a:t>
-            </a:r>
-            <a:r>
-              <a:rPr lang="en-US" baseline="0" dirty="0" err="1" smtClean="0"/>
-              <a:t>Texturen</a:t>
-            </a:r>
-            <a:r>
-              <a:rPr lang="en-US" baseline="0" dirty="0" smtClean="0"/>
-              <a:t> und </a:t>
-            </a:r>
-            <a:r>
-              <a:rPr lang="en-US" baseline="0" dirty="0" err="1" smtClean="0"/>
-              <a:t>Animationen</a:t>
-            </a:r>
-            <a:r>
-              <a:rPr lang="en-US" baseline="0" dirty="0" smtClean="0"/>
-              <a:t> </a:t>
-            </a:r>
-            <a:r>
-              <a:rPr lang="en-US" baseline="0" dirty="0" err="1" smtClean="0"/>
-              <a:t>versprochen</a:t>
-            </a:r>
-            <a:r>
-              <a:rPr lang="en-US" baseline="0" dirty="0" smtClean="0"/>
-              <a:t> und </a:t>
-            </a:r>
-            <a:r>
-              <a:rPr lang="en-US" baseline="0" dirty="0" err="1" smtClean="0"/>
-              <a:t>auch</a:t>
-            </a:r>
-            <a:r>
-              <a:rPr lang="en-US" baseline="0" dirty="0" smtClean="0"/>
-              <a:t> das </a:t>
-            </a:r>
-            <a:r>
-              <a:rPr lang="en-US" baseline="0" dirty="0" err="1" smtClean="0"/>
-              <a:t>konnten</a:t>
-            </a:r>
-            <a:r>
-              <a:rPr lang="en-US" baseline="0" dirty="0" smtClean="0"/>
-              <a:t> </a:t>
-            </a:r>
-            <a:r>
-              <a:rPr lang="en-US" baseline="0" dirty="0" err="1" smtClean="0"/>
-              <a:t>wir</a:t>
-            </a:r>
-            <a:r>
-              <a:rPr lang="en-US" baseline="0" dirty="0" smtClean="0"/>
-              <a:t> </a:t>
-            </a:r>
-            <a:r>
-              <a:rPr lang="en-US" baseline="0" dirty="0" err="1" smtClean="0"/>
-              <a:t>wie</a:t>
-            </a:r>
-            <a:r>
-              <a:rPr lang="en-US" baseline="0" dirty="0" smtClean="0"/>
-              <a:t> </a:t>
-            </a:r>
-            <a:r>
-              <a:rPr lang="en-US" baseline="0" dirty="0" err="1" smtClean="0"/>
-              <a:t>geplant</a:t>
-            </a:r>
-            <a:r>
-              <a:rPr lang="en-US" baseline="0" dirty="0" smtClean="0"/>
-              <a:t> </a:t>
-            </a:r>
-            <a:r>
-              <a:rPr lang="en-US" baseline="0" dirty="0" err="1" smtClean="0"/>
-              <a:t>einhalten</a:t>
-            </a:r>
-            <a:r>
-              <a:rPr lang="en-US" baseline="0" dirty="0" smtClean="0"/>
-              <a:t>. </a:t>
-            </a:r>
-            <a:r>
-              <a:rPr lang="en-US" baseline="0" dirty="0" err="1" smtClean="0"/>
-              <a:t>Zusaetzlich</a:t>
-            </a:r>
-            <a:r>
-              <a:rPr lang="en-US" baseline="0" dirty="0" smtClean="0"/>
-              <a:t> </a:t>
-            </a:r>
-            <a:r>
-              <a:rPr lang="en-US" baseline="0" dirty="0" err="1" smtClean="0"/>
-              <a:t>konnten</a:t>
-            </a:r>
-            <a:r>
-              <a:rPr lang="en-US" baseline="0" dirty="0" smtClean="0"/>
-              <a:t> </a:t>
-            </a:r>
-            <a:r>
-              <a:rPr lang="en-US" baseline="0" dirty="0" err="1" smtClean="0"/>
-              <a:t>wir</a:t>
-            </a:r>
-            <a:r>
-              <a:rPr lang="en-US" baseline="0" dirty="0" smtClean="0"/>
-              <a:t> </a:t>
-            </a:r>
-            <a:r>
-              <a:rPr lang="en-US" baseline="0" dirty="0" err="1" smtClean="0"/>
-              <a:t>gluecklicher</a:t>
-            </a:r>
-            <a:r>
-              <a:rPr lang="en-US" baseline="0" dirty="0" smtClean="0"/>
-              <a:t> Weise </a:t>
-            </a:r>
-            <a:r>
-              <a:rPr lang="en-US" baseline="0" dirty="0" err="1" smtClean="0"/>
-              <a:t>einen</a:t>
-            </a:r>
-            <a:r>
-              <a:rPr lang="en-US" baseline="0" dirty="0" smtClean="0"/>
-              <a:t> Sound-Designer von den Abby Roads Studio’s, Elias Knop, </a:t>
-            </a:r>
-            <a:r>
-              <a:rPr lang="en-US" baseline="0" dirty="0" err="1" smtClean="0"/>
-              <a:t>fuer</a:t>
-            </a:r>
-            <a:r>
-              <a:rPr lang="en-US" baseline="0" dirty="0" smtClean="0"/>
-              <a:t> </a:t>
-            </a:r>
-            <a:r>
-              <a:rPr lang="en-US" baseline="0" dirty="0" err="1" smtClean="0"/>
               <a:t>uns</a:t>
             </a:r>
             <a:r>
               <a:rPr lang="en-US" baseline="0" dirty="0" smtClean="0"/>
-              <a:t> </a:t>
-            </a:r>
-            <a:r>
-              <a:rPr lang="en-US" baseline="0" dirty="0" err="1" smtClean="0"/>
-              <a:t>gewinnen</a:t>
-            </a:r>
-            <a:r>
-              <a:rPr lang="en-US" baseline="0" dirty="0" smtClean="0"/>
-              <a:t> und </a:t>
-            </a:r>
-            <a:r>
-              <a:rPr lang="en-US" baseline="0" dirty="0" err="1" smtClean="0"/>
-              <a:t>somit</a:t>
-            </a:r>
-            <a:r>
-              <a:rPr lang="en-US" baseline="0" dirty="0" smtClean="0"/>
-              <a:t> </a:t>
-            </a:r>
-            <a:r>
-              <a:rPr lang="en-US" baseline="0" dirty="0" err="1" smtClean="0"/>
-              <a:t>koennen</a:t>
-            </a:r>
-            <a:r>
-              <a:rPr lang="en-US" baseline="0" dirty="0" smtClean="0"/>
-              <a:t> </a:t>
-            </a:r>
-            <a:r>
-              <a:rPr lang="en-US" baseline="0" dirty="0" err="1" smtClean="0"/>
-              <a:t>wir</a:t>
-            </a:r>
-            <a:r>
-              <a:rPr lang="en-US" baseline="0" dirty="0" smtClean="0"/>
-              <a:t> </a:t>
-            </a:r>
-            <a:r>
-              <a:rPr lang="en-US" baseline="0" dirty="0" err="1" smtClean="0"/>
-              <a:t>euch</a:t>
-            </a:r>
-            <a:r>
-              <a:rPr lang="en-US" baseline="0" dirty="0" smtClean="0"/>
-              <a:t> </a:t>
-            </a:r>
-            <a:r>
-              <a:rPr lang="en-US" baseline="0" dirty="0" err="1" smtClean="0"/>
-              <a:t>heute</a:t>
-            </a:r>
-            <a:r>
-              <a:rPr lang="en-US" baseline="0" dirty="0" smtClean="0"/>
-              <a:t> </a:t>
-            </a:r>
-            <a:r>
-              <a:rPr lang="en-US" baseline="0" dirty="0" err="1" smtClean="0"/>
-              <a:t>auch</a:t>
-            </a:r>
-            <a:r>
-              <a:rPr lang="en-US" baseline="0" dirty="0" smtClean="0"/>
-              <a:t> </a:t>
-            </a:r>
-            <a:r>
-              <a:rPr lang="en-US" baseline="0" dirty="0" err="1" smtClean="0"/>
-              <a:t>bereits</a:t>
-            </a:r>
-            <a:r>
-              <a:rPr lang="en-US" baseline="0" dirty="0" smtClean="0"/>
-              <a:t> </a:t>
-            </a:r>
-            <a:r>
-              <a:rPr lang="en-US" baseline="0" dirty="0" err="1" smtClean="0"/>
-              <a:t>einige</a:t>
-            </a:r>
-            <a:r>
-              <a:rPr lang="en-US" baseline="0" dirty="0" smtClean="0"/>
-              <a:t> Sounds </a:t>
-            </a:r>
-            <a:r>
-              <a:rPr lang="en-US" baseline="0" dirty="0" err="1" smtClean="0"/>
-              <a:t>im</a:t>
-            </a:r>
-            <a:r>
-              <a:rPr lang="en-US" baseline="0" dirty="0" smtClean="0"/>
-              <a:t> Spiel </a:t>
-            </a:r>
-            <a:r>
-              <a:rPr lang="en-US" baseline="0" dirty="0" err="1" smtClean="0"/>
-              <a:t>praesentieren</a:t>
-            </a:r>
-            <a:r>
-              <a:rPr lang="en-US" baseline="0" dirty="0" smtClean="0"/>
-              <a:t>. </a:t>
-            </a:r>
-            <a:br>
-              <a:rPr lang="en-US" baseline="0" dirty="0" smtClean="0"/>
-            </a:br>
-            <a:r>
-              <a:rPr lang="en-US" baseline="0" dirty="0" err="1" smtClean="0"/>
-              <a:t>Zu</a:t>
-            </a:r>
-            <a:r>
-              <a:rPr lang="en-US" baseline="0" dirty="0" smtClean="0"/>
-              <a:t> </a:t>
-            </a:r>
-            <a:r>
-              <a:rPr lang="en-US" baseline="0" dirty="0" err="1" smtClean="0"/>
-              <a:t>guter</a:t>
-            </a:r>
-            <a:r>
-              <a:rPr lang="en-US" baseline="0" dirty="0" smtClean="0"/>
-              <a:t> </a:t>
-            </a:r>
-            <a:r>
-              <a:rPr lang="en-US" baseline="0" dirty="0" err="1" smtClean="0"/>
-              <a:t>Letzt</a:t>
-            </a:r>
-            <a:r>
-              <a:rPr lang="en-US" baseline="0" dirty="0" smtClean="0"/>
-              <a:t> </a:t>
-            </a:r>
-            <a:r>
-              <a:rPr lang="en-US" baseline="0" dirty="0" err="1" smtClean="0"/>
-              <a:t>haben</a:t>
-            </a:r>
-            <a:r>
-              <a:rPr lang="en-US" baseline="0" dirty="0" smtClean="0"/>
-              <a:t> </a:t>
-            </a:r>
-            <a:r>
-              <a:rPr lang="en-US" baseline="0" dirty="0" err="1" smtClean="0"/>
-              <a:t>wir</a:t>
-            </a:r>
-            <a:r>
-              <a:rPr lang="en-US" baseline="0" dirty="0" smtClean="0"/>
-              <a:t> </a:t>
-            </a:r>
-            <a:r>
-              <a:rPr lang="en-US" baseline="0" dirty="0" err="1" smtClean="0"/>
-              <a:t>angekuendigt</a:t>
-            </a:r>
-            <a:r>
-              <a:rPr lang="en-US" baseline="0" dirty="0" smtClean="0"/>
-              <a:t> </a:t>
-            </a:r>
-            <a:r>
-              <a:rPr lang="en-US" baseline="0" dirty="0" err="1" smtClean="0"/>
-              <a:t>euch</a:t>
-            </a:r>
-            <a:r>
-              <a:rPr lang="en-US" baseline="0" dirty="0" smtClean="0"/>
-              <a:t> die </a:t>
-            </a:r>
-            <a:r>
-              <a:rPr lang="en-US" baseline="0" dirty="0" err="1" smtClean="0"/>
-              <a:t>komplette</a:t>
-            </a:r>
-            <a:r>
-              <a:rPr lang="en-US" baseline="0" dirty="0" smtClean="0"/>
-              <a:t> </a:t>
-            </a:r>
-            <a:r>
-              <a:rPr lang="en-US" baseline="0" dirty="0" err="1" smtClean="0"/>
-              <a:t>zweite</a:t>
-            </a:r>
-            <a:r>
-              <a:rPr lang="en-US" baseline="0" dirty="0" smtClean="0"/>
-              <a:t> </a:t>
-            </a:r>
-            <a:r>
-              <a:rPr lang="en-US" baseline="0" dirty="0" err="1" smtClean="0"/>
-              <a:t>Mechanik</a:t>
-            </a:r>
-            <a:r>
-              <a:rPr lang="en-US" baseline="0" dirty="0" smtClean="0"/>
-              <a:t>: “</a:t>
-            </a:r>
-            <a:r>
-              <a:rPr lang="en-US" baseline="0" dirty="0" err="1" smtClean="0"/>
-              <a:t>Posession</a:t>
-            </a:r>
-            <a:r>
-              <a:rPr lang="en-US" baseline="0" dirty="0" smtClean="0"/>
-              <a:t>” </a:t>
-            </a:r>
-            <a:r>
-              <a:rPr lang="en-US" baseline="0" dirty="0" err="1" smtClean="0"/>
-              <a:t>heute</a:t>
-            </a:r>
-            <a:r>
-              <a:rPr lang="en-US" baseline="0" dirty="0" smtClean="0"/>
-              <a:t> </a:t>
-            </a:r>
-            <a:r>
-              <a:rPr lang="en-US" baseline="0" dirty="0" err="1" smtClean="0"/>
-              <a:t>zu</a:t>
-            </a:r>
-            <a:r>
-              <a:rPr lang="en-US" baseline="0" dirty="0" smtClean="0"/>
-              <a:t> </a:t>
-            </a:r>
-            <a:r>
-              <a:rPr lang="en-US" baseline="0" dirty="0" err="1" smtClean="0"/>
-              <a:t>zeigen</a:t>
-            </a:r>
-            <a:r>
-              <a:rPr lang="en-US" baseline="0" dirty="0" smtClean="0"/>
-              <a:t> und </a:t>
-            </a:r>
-            <a:r>
-              <a:rPr lang="en-US" baseline="0" dirty="0" err="1" smtClean="0"/>
-              <a:t>auch</a:t>
-            </a:r>
-            <a:r>
-              <a:rPr lang="en-US" baseline="0" dirty="0" smtClean="0"/>
-              <a:t> das </a:t>
-            </a:r>
-            <a:r>
-              <a:rPr lang="en-US" baseline="0" dirty="0" err="1" smtClean="0"/>
-              <a:t>werden</a:t>
-            </a:r>
-            <a:r>
-              <a:rPr lang="en-US" baseline="0" dirty="0" smtClean="0"/>
-              <a:t> </a:t>
-            </a:r>
-            <a:r>
-              <a:rPr lang="en-US" baseline="0" dirty="0" err="1" smtClean="0"/>
-              <a:t>wir</a:t>
-            </a:r>
-            <a:r>
-              <a:rPr lang="en-US" baseline="0" dirty="0" smtClean="0"/>
-              <a:t> </a:t>
-            </a:r>
-            <a:r>
-              <a:rPr lang="en-US" baseline="0" dirty="0" err="1" smtClean="0"/>
-              <a:t>einhalten</a:t>
-            </a:r>
-            <a:r>
-              <a:rPr lang="en-US" baseline="0" dirty="0" smtClean="0"/>
-              <a:t>.</a:t>
-            </a:r>
-            <a:br>
-              <a:rPr lang="en-US" baseline="0" dirty="0" smtClean="0"/>
-            </a:br>
-            <a:r>
-              <a:rPr lang="en-US" baseline="0" dirty="0" smtClean="0"/>
-              <a:t/>
-            </a:r>
-            <a:br>
-              <a:rPr lang="en-US" baseline="0" dirty="0" smtClean="0"/>
-            </a:br>
-            <a:r>
-              <a:rPr lang="en-US" baseline="0" dirty="0" smtClean="0"/>
-              <a:t>Bevor </a:t>
-            </a:r>
-            <a:r>
-              <a:rPr lang="en-US" baseline="0" dirty="0" err="1" smtClean="0"/>
-              <a:t>wir</a:t>
-            </a:r>
-            <a:r>
-              <a:rPr lang="en-US" baseline="0" dirty="0" smtClean="0"/>
-              <a:t> </a:t>
-            </a:r>
-            <a:r>
-              <a:rPr lang="en-US" baseline="0" dirty="0" err="1" smtClean="0"/>
-              <a:t>euch</a:t>
-            </a:r>
-            <a:r>
-              <a:rPr lang="en-US" baseline="0" dirty="0" smtClean="0"/>
-              <a:t> </a:t>
-            </a:r>
-            <a:r>
-              <a:rPr lang="en-US" baseline="0" dirty="0" err="1" smtClean="0"/>
-              <a:t>gleich</a:t>
-            </a:r>
-            <a:r>
-              <a:rPr lang="en-US" baseline="0" dirty="0" smtClean="0"/>
-              <a:t> das Spiel </a:t>
-            </a:r>
-            <a:r>
-              <a:rPr lang="en-US" baseline="0" dirty="0" err="1" smtClean="0"/>
-              <a:t>zeigen</a:t>
-            </a:r>
-            <a:r>
-              <a:rPr lang="en-US" baseline="0" dirty="0" smtClean="0"/>
-              <a:t>, </a:t>
-            </a:r>
-            <a:r>
-              <a:rPr lang="en-US" baseline="0" dirty="0" err="1" smtClean="0"/>
-              <a:t>kommen</a:t>
-            </a:r>
-            <a:r>
-              <a:rPr lang="en-US" baseline="0" dirty="0" smtClean="0"/>
-              <a:t> </a:t>
-            </a:r>
-            <a:r>
-              <a:rPr lang="en-US" baseline="0" dirty="0" err="1" smtClean="0"/>
-              <a:t>wir</a:t>
-            </a:r>
-            <a:r>
-              <a:rPr lang="en-US" baseline="0" dirty="0" smtClean="0"/>
-              <a:t> </a:t>
-            </a:r>
-            <a:r>
-              <a:rPr lang="en-US" baseline="0" dirty="0" err="1" smtClean="0"/>
-              <a:t>noch</a:t>
-            </a:r>
-            <a:r>
-              <a:rPr lang="en-US" baseline="0" dirty="0" smtClean="0"/>
-              <a:t> </a:t>
-            </a:r>
-            <a:r>
-              <a:rPr lang="en-US" baseline="0" dirty="0" err="1" smtClean="0"/>
-              <a:t>kurz</a:t>
-            </a:r>
-            <a:r>
-              <a:rPr lang="en-US" baseline="0" dirty="0" smtClean="0"/>
-              <a:t> </a:t>
-            </a:r>
-            <a:r>
-              <a:rPr lang="en-US" baseline="0" dirty="0" err="1" smtClean="0"/>
-              <a:t>zu</a:t>
-            </a:r>
-            <a:r>
-              <a:rPr lang="en-US" baseline="0" dirty="0" smtClean="0"/>
-              <a:t> den </a:t>
-            </a:r>
-            <a:r>
-              <a:rPr lang="en-US" baseline="0" dirty="0" err="1" smtClean="0"/>
-              <a:t>Zielen</a:t>
-            </a:r>
-            <a:r>
-              <a:rPr lang="en-US" baseline="0" dirty="0" smtClean="0"/>
-              <a:t>, die </a:t>
-            </a:r>
-            <a:r>
-              <a:rPr lang="en-US" baseline="0" dirty="0" err="1" smtClean="0"/>
-              <a:t>wir</a:t>
-            </a:r>
-            <a:r>
-              <a:rPr lang="en-US" baseline="0" dirty="0" smtClean="0"/>
-              <a:t> </a:t>
-            </a:r>
-            <a:r>
-              <a:rPr lang="en-US" baseline="0" dirty="0" err="1" smtClean="0"/>
-              <a:t>uns</a:t>
-            </a:r>
-            <a:r>
-              <a:rPr lang="en-US" baseline="0" dirty="0" smtClean="0"/>
-              <a:t> </a:t>
-            </a:r>
-            <a:r>
-              <a:rPr lang="en-US" baseline="0" dirty="0" err="1" smtClean="0"/>
-              <a:t>bis</a:t>
-            </a:r>
-            <a:r>
-              <a:rPr lang="en-US" baseline="0" dirty="0" smtClean="0"/>
-              <a:t> </a:t>
-            </a:r>
-            <a:r>
-              <a:rPr lang="en-US" baseline="0" dirty="0" err="1" smtClean="0"/>
-              <a:t>zum</a:t>
-            </a:r>
-            <a:r>
-              <a:rPr lang="en-US" baseline="0" dirty="0" smtClean="0"/>
-              <a:t> </a:t>
-            </a:r>
-            <a:r>
-              <a:rPr lang="en-US" baseline="0" dirty="0" err="1" smtClean="0"/>
-              <a:t>Goldmaster</a:t>
-            </a:r>
-            <a:r>
-              <a:rPr lang="en-US" baseline="0" dirty="0" smtClean="0"/>
-              <a:t> </a:t>
-            </a:r>
-            <a:r>
-              <a:rPr lang="en-US" baseline="0" dirty="0" err="1" smtClean="0"/>
-              <a:t>gesetzt</a:t>
-            </a:r>
-            <a:r>
-              <a:rPr lang="en-US" baseline="0" dirty="0" smtClean="0"/>
-              <a:t> </a:t>
-            </a:r>
-            <a:r>
-              <a:rPr lang="en-US" baseline="0" dirty="0" err="1" smtClean="0"/>
-              <a:t>haben</a:t>
-            </a:r>
-            <a:r>
-              <a:rPr lang="en-US" baseline="0" dirty="0" smtClean="0"/>
-              <a:t>.</a:t>
+              <a:t> das Spiel direct </a:t>
+            </a:r>
+            <a:r>
+              <a:rPr lang="en-US" baseline="0" dirty="0" err="1" smtClean="0"/>
+              <a:t>einmal</a:t>
+            </a:r>
+            <a:r>
+              <a:rPr lang="en-US" baseline="0" dirty="0" smtClean="0"/>
+              <a:t> an. </a:t>
             </a:r>
             <a:endParaRPr lang="de-DE" dirty="0"/>
           </a:p>
@@ -2596,39 +2109,191 @@
           <a:p>
             <a:r>
               <a:rPr lang="en-US" dirty="0" err="1" smtClean="0"/>
-              <a:t>Zu</a:t>
-            </a:r>
-            <a:r>
-              <a:rPr lang="en-US" baseline="0" dirty="0" smtClean="0"/>
-              <a:t> Gate 3 </a:t>
-            </a:r>
-            <a:r>
-              <a:rPr lang="en-US" baseline="0" dirty="0" err="1" smtClean="0"/>
+              <a:t>Fuer</a:t>
+            </a:r>
+            <a:r>
+              <a:rPr lang="en-US" dirty="0" smtClean="0"/>
+              <a:t> Gate 2 </a:t>
+            </a:r>
+            <a:r>
+              <a:rPr lang="en-US" dirty="0" err="1" smtClean="0"/>
               <a:t>werden</a:t>
             </a:r>
             <a:r>
-              <a:rPr lang="en-US" baseline="0" dirty="0" smtClean="0"/>
+              <a:rPr lang="en-US" dirty="0" smtClean="0"/>
               <a:t> </a:t>
             </a:r>
             <a:r>
-              <a:rPr lang="en-US" baseline="0" dirty="0" err="1" smtClean="0"/>
+              <a:rPr lang="en-US" dirty="0" err="1" smtClean="0"/>
               <a:t>wir</a:t>
             </a:r>
             <a:r>
-              <a:rPr lang="en-US" baseline="0" dirty="0" smtClean="0"/>
+              <a:rPr lang="en-US" dirty="0" smtClean="0"/>
               <a:t> </a:t>
             </a:r>
             <a:r>
+              <a:rPr lang="en-US" dirty="0" err="1" smtClean="0"/>
+              <a:t>einen</a:t>
+            </a:r>
+            <a:r>
+              <a:rPr lang="en-US" baseline="0" dirty="0" smtClean="0"/>
+              <a:t> </a:t>
+            </a:r>
+            <a:r>
+              <a:rPr lang="en-US" baseline="0" dirty="0" err="1" smtClean="0"/>
+              <a:t>zweiten</a:t>
+            </a:r>
+            <a:r>
+              <a:rPr lang="en-US" baseline="0" dirty="0" smtClean="0"/>
+              <a:t> </a:t>
+            </a:r>
+            <a:r>
+              <a:rPr lang="en-US" baseline="0" dirty="0" err="1" smtClean="0"/>
+              <a:t>Raum</a:t>
+            </a:r>
+            <a:r>
+              <a:rPr lang="en-US" baseline="0" dirty="0" smtClean="0"/>
+              <a:t>, </a:t>
+            </a:r>
+            <a:r>
+              <a:rPr lang="en-US" baseline="0" dirty="0" err="1" smtClean="0"/>
+              <a:t>naemlich</a:t>
+            </a:r>
+            <a:r>
+              <a:rPr lang="en-US" baseline="0" dirty="0" smtClean="0"/>
+              <a:t> das </a:t>
+            </a:r>
+            <a:r>
+              <a:rPr lang="en-US" baseline="0" dirty="0" err="1" smtClean="0"/>
+              <a:t>voll</a:t>
+            </a:r>
+            <a:r>
+              <a:rPr lang="en-US" baseline="0" dirty="0" smtClean="0"/>
+              <a:t> </a:t>
+            </a:r>
+            <a:r>
+              <a:rPr lang="en-US" baseline="0" dirty="0" err="1" smtClean="0"/>
+              <a:t>texturierte</a:t>
+            </a:r>
+            <a:r>
+              <a:rPr lang="en-US" baseline="0" dirty="0" smtClean="0"/>
+              <a:t> Labor, </a:t>
+            </a:r>
+            <a:r>
+              <a:rPr lang="en-US" baseline="0" dirty="0" err="1" smtClean="0"/>
+              <a:t>vorstellen</a:t>
+            </a:r>
+            <a:r>
+              <a:rPr lang="en-US" baseline="0" dirty="0" smtClean="0"/>
+              <a:t> und </a:t>
+            </a:r>
+            <a:r>
+              <a:rPr lang="en-US" baseline="0" dirty="0" err="1" smtClean="0"/>
+              <a:t>unser</a:t>
+            </a:r>
+            <a:r>
+              <a:rPr lang="en-US" baseline="0" dirty="0" smtClean="0"/>
+              <a:t> </a:t>
+            </a:r>
+            <a:r>
+              <a:rPr lang="en-US" baseline="0" dirty="0" err="1" smtClean="0"/>
+              <a:t>Hauptcharacter</a:t>
+            </a:r>
+            <a:r>
+              <a:rPr lang="en-US" baseline="0" dirty="0" smtClean="0"/>
+              <a:t> </a:t>
+            </a:r>
+            <a:r>
+              <a:rPr lang="en-US" baseline="0" dirty="0" err="1" smtClean="0"/>
+              <a:t>sollte</a:t>
+            </a:r>
+            <a:r>
+              <a:rPr lang="en-US" baseline="0" dirty="0" smtClean="0"/>
+              <a:t> </a:t>
+            </a:r>
+            <a:r>
+              <a:rPr lang="en-US" baseline="0" dirty="0" err="1" smtClean="0"/>
+              <a:t>dann</a:t>
+            </a:r>
+            <a:r>
+              <a:rPr lang="en-US" baseline="0" dirty="0" smtClean="0"/>
+              <a:t> </a:t>
+            </a:r>
+            <a:r>
+              <a:rPr lang="en-US" baseline="0" dirty="0" err="1" smtClean="0"/>
+              <a:t>auch</a:t>
+            </a:r>
+            <a:r>
+              <a:rPr lang="en-US" baseline="0" dirty="0" smtClean="0"/>
+              <a:t> </a:t>
+            </a:r>
+            <a:r>
+              <a:rPr lang="en-US" baseline="0" dirty="0" err="1" smtClean="0"/>
+              <a:t>bereits</a:t>
+            </a:r>
+            <a:r>
+              <a:rPr lang="en-US" baseline="0" dirty="0" smtClean="0"/>
+              <a:t> </a:t>
+            </a:r>
+            <a:r>
+              <a:rPr lang="en-US" baseline="0" dirty="0" err="1" smtClean="0"/>
+              <a:t>einige</a:t>
+            </a:r>
+            <a:r>
+              <a:rPr lang="en-US" baseline="0" dirty="0" smtClean="0"/>
+              <a:t> Basis-</a:t>
+            </a:r>
+            <a:r>
+              <a:rPr lang="en-US" baseline="0" dirty="0" err="1" smtClean="0"/>
+              <a:t>Animationen</a:t>
+            </a:r>
+            <a:r>
+              <a:rPr lang="en-US" baseline="0" dirty="0" smtClean="0"/>
+              <a:t> </a:t>
+            </a:r>
+            <a:r>
+              <a:rPr lang="en-US" baseline="0" dirty="0" err="1" smtClean="0"/>
+              <a:t>besitzen</a:t>
+            </a:r>
+            <a:r>
+              <a:rPr lang="en-US" baseline="0" dirty="0" smtClean="0"/>
+              <a:t>. </a:t>
+            </a:r>
+            <a:r>
+              <a:rPr lang="en-US" baseline="0" dirty="0" err="1" smtClean="0"/>
+              <a:t>Ausserdem</a:t>
+            </a:r>
+            <a:r>
+              <a:rPr lang="en-US" baseline="0" dirty="0" smtClean="0"/>
+              <a:t> </a:t>
+            </a:r>
+            <a:r>
+              <a:rPr lang="en-US" baseline="0" dirty="0" err="1" smtClean="0"/>
+              <a:t>werden</a:t>
+            </a:r>
+            <a:r>
+              <a:rPr lang="en-US" baseline="0" dirty="0" smtClean="0"/>
+              <a:t> </a:t>
+            </a:r>
+            <a:r>
+              <a:rPr lang="en-US" baseline="0" dirty="0" err="1" smtClean="0"/>
+              <a:t>wir</a:t>
+            </a:r>
+            <a:r>
+              <a:rPr lang="en-US" baseline="0" dirty="0" smtClean="0"/>
+              <a:t> </a:t>
+            </a:r>
+            <a:r>
               <a:rPr lang="en-US" baseline="0" dirty="0" err="1" smtClean="0"/>
               <a:t>euch</a:t>
             </a:r>
             <a:r>
               <a:rPr lang="en-US" baseline="0" dirty="0" smtClean="0"/>
-              <a:t> das </a:t>
-            </a:r>
-            <a:r>
-              <a:rPr lang="en-US" baseline="0" dirty="0" err="1" smtClean="0"/>
-              <a:t>fertig</a:t>
+              <a:t> die </a:t>
+            </a:r>
+            <a:r>
+              <a:rPr lang="en-US" baseline="0" dirty="0" err="1" smtClean="0"/>
+              <a:t>komplette</a:t>
             </a:r>
             <a:r>
               <a:rPr lang="en-US" baseline="0" dirty="0" smtClean="0"/>
@@ -2636,31 +2301,7 @@
             </a:r>
             <a:r>
               <a:rPr lang="en-US" baseline="0" dirty="0" err="1" smtClean="0"/>
-              <a:t>gepolishte</a:t>
-            </a:r>
-            <a:r>
-              <a:rPr lang="en-US" baseline="0" dirty="0" smtClean="0"/>
-              <a:t> Spiel </a:t>
-            </a:r>
-            <a:r>
-              <a:rPr lang="en-US" baseline="0" dirty="0" err="1" smtClean="0"/>
-              <a:t>zeigen</a:t>
-            </a:r>
-            <a:r>
-              <a:rPr lang="en-US" baseline="0" dirty="0" smtClean="0"/>
-              <a:t>. Das </a:t>
-            </a:r>
-            <a:r>
-              <a:rPr lang="en-US" baseline="0" dirty="0" err="1" smtClean="0"/>
-              <a:t>bedeutet</a:t>
-            </a:r>
-            <a:r>
-              <a:rPr lang="en-US" baseline="0" dirty="0" smtClean="0"/>
-              <a:t>, </a:t>
-            </a:r>
-            <a:r>
-              <a:rPr lang="en-US" baseline="0" dirty="0" err="1" smtClean="0"/>
-              <a:t>dass</a:t>
+              <a:t>Posession-Mechanik</a:t>
             </a:r>
             <a:r>
               <a:rPr lang="en-US" baseline="0" dirty="0" smtClean="0"/>
@@ -2668,490 +2309,27 @@
             </a:r>
             <a:r>
               <a:rPr lang="en-US" baseline="0" dirty="0" err="1" smtClean="0"/>
-              <a:t>alle</a:t>
-            </a:r>
-            <a:r>
-              <a:rPr lang="en-US" baseline="0" dirty="0" smtClean="0"/>
-              <a:t> </a:t>
-            </a:r>
-            <a:r>
-              <a:rPr lang="en-US" baseline="0" dirty="0" err="1" smtClean="0"/>
-              <a:t>Raeume</a:t>
-            </a:r>
-            <a:r>
-              <a:rPr lang="en-US" baseline="0" dirty="0" smtClean="0"/>
-              <a:t> </a:t>
-            </a:r>
-            <a:r>
-              <a:rPr lang="en-US" baseline="0" dirty="0" err="1" smtClean="0"/>
-              <a:t>vollstaendig</a:t>
-            </a:r>
-            <a:r>
-              <a:rPr lang="en-US" baseline="0" dirty="0" smtClean="0"/>
-              <a:t> </a:t>
-            </a:r>
-            <a:r>
-              <a:rPr lang="en-US" baseline="0" dirty="0" err="1" smtClean="0"/>
-              <a:t>eingeraeumt</a:t>
-            </a:r>
-            <a:r>
-              <a:rPr lang="en-US" baseline="0" dirty="0" smtClean="0"/>
-              <a:t> und </a:t>
-            </a:r>
-            <a:r>
-              <a:rPr lang="en-US" baseline="0" dirty="0" err="1" smtClean="0"/>
-              <a:t>mit</a:t>
-            </a:r>
-            <a:r>
-              <a:rPr lang="en-US" baseline="0" dirty="0" smtClean="0"/>
-              <a:t> den </a:t>
-            </a:r>
-            <a:r>
-              <a:rPr lang="en-US" baseline="0" dirty="0" err="1" smtClean="0"/>
-              <a:t>zuvor</a:t>
-            </a:r>
-            <a:r>
-              <a:rPr lang="en-US" baseline="0" dirty="0" smtClean="0"/>
-              <a:t> </a:t>
-            </a:r>
-            <a:r>
-              <a:rPr lang="en-US" baseline="0" dirty="0" err="1" smtClean="0"/>
-              <a:t>erwaehnten</a:t>
-            </a:r>
-            <a:r>
-              <a:rPr lang="en-US" baseline="0" dirty="0" smtClean="0"/>
-              <a:t> environmental Storytelling-</a:t>
-            </a:r>
-            <a:r>
-              <a:rPr lang="en-US" baseline="0" dirty="0" err="1" smtClean="0"/>
-              <a:t>Elementen</a:t>
-            </a:r>
-            <a:r>
-              <a:rPr lang="en-US" baseline="0" dirty="0" smtClean="0"/>
-              <a:t> </a:t>
-            </a:r>
-            <a:r>
-              <a:rPr lang="en-US" baseline="0" dirty="0" err="1" smtClean="0"/>
-              <a:t>bestueckt</a:t>
-            </a:r>
-            <a:r>
-              <a:rPr lang="en-US" baseline="0" dirty="0" smtClean="0"/>
-              <a:t> </a:t>
-            </a:r>
-            <a:r>
-              <a:rPr lang="en-US" baseline="0" dirty="0" err="1" smtClean="0"/>
-              <a:t>wurden</a:t>
-            </a:r>
-            <a:r>
-              <a:rPr lang="en-US" baseline="0" dirty="0" smtClean="0"/>
-              <a:t>. </a:t>
-            </a:r>
-            <a:r>
-              <a:rPr lang="en-US" baseline="0" dirty="0" err="1" smtClean="0"/>
-              <a:t>Ausserdem</a:t>
-            </a:r>
-            <a:r>
-              <a:rPr lang="en-US" baseline="0" dirty="0" smtClean="0"/>
-              <a:t> </a:t>
-            </a:r>
-            <a:r>
-              <a:rPr lang="en-US" baseline="0" dirty="0" err="1" smtClean="0"/>
-              <a:t>kommen</a:t>
-            </a:r>
-            <a:r>
-              <a:rPr lang="en-US" baseline="0" dirty="0" smtClean="0"/>
-              <a:t> </a:t>
-            </a:r>
-            <a:r>
-              <a:rPr lang="en-US" baseline="0" dirty="0" err="1" smtClean="0"/>
-              <a:t>noch</a:t>
-            </a:r>
-            <a:r>
-              <a:rPr lang="en-US" baseline="0" dirty="0" smtClean="0"/>
-              <a:t> </a:t>
-            </a:r>
-            <a:r>
-              <a:rPr lang="en-US" baseline="0" dirty="0" err="1" smtClean="0"/>
-              <a:t>einige</a:t>
-            </a:r>
-            <a:r>
-              <a:rPr lang="en-US" baseline="0" dirty="0" smtClean="0"/>
-              <a:t> VFX- und Sound-</a:t>
-            </a:r>
-            <a:r>
-              <a:rPr lang="en-US" baseline="0" dirty="0" err="1" smtClean="0"/>
-              <a:t>Effekte</a:t>
-            </a:r>
-            <a:r>
-              <a:rPr lang="en-US" baseline="0" dirty="0" smtClean="0"/>
-              <a:t> </a:t>
-            </a:r>
-            <a:r>
-              <a:rPr lang="en-US" baseline="0" dirty="0" err="1" smtClean="0"/>
-              <a:t>dazu</a:t>
-            </a:r>
-            <a:r>
-              <a:rPr lang="en-US" baseline="0" dirty="0" smtClean="0"/>
-              <a:t>, </a:t>
-            </a:r>
-            <a:r>
-              <a:rPr lang="en-US" baseline="0" dirty="0" err="1" smtClean="0"/>
-              <a:t>unsere</a:t>
-            </a:r>
-            <a:r>
-              <a:rPr lang="en-US" baseline="0" dirty="0" smtClean="0"/>
-              <a:t> </a:t>
-            </a:r>
-            <a:r>
-              <a:rPr lang="en-US" baseline="0" dirty="0" err="1" smtClean="0"/>
-              <a:t>Wachen</a:t>
-            </a:r>
-            <a:r>
-              <a:rPr lang="en-US" baseline="0" dirty="0" smtClean="0"/>
-              <a:t> </a:t>
-            </a:r>
-            <a:r>
-              <a:rPr lang="en-US" baseline="0" dirty="0" err="1" smtClean="0"/>
-              <a:t>werden</a:t>
-            </a:r>
-            <a:r>
-              <a:rPr lang="en-US" baseline="0" dirty="0" smtClean="0"/>
-              <a:t> </a:t>
-            </a:r>
-            <a:r>
-              <a:rPr lang="en-US" baseline="0" dirty="0" err="1" smtClean="0"/>
-              <a:t>ein</a:t>
-            </a:r>
-            <a:r>
-              <a:rPr lang="en-US" baseline="0" dirty="0" smtClean="0"/>
-              <a:t> </a:t>
-            </a:r>
-            <a:r>
-              <a:rPr lang="en-US" baseline="0" dirty="0" err="1" smtClean="0"/>
-              <a:t>wenig</a:t>
-            </a:r>
-            <a:r>
-              <a:rPr lang="en-US" baseline="0" dirty="0" smtClean="0"/>
-              <a:t> </a:t>
-            </a:r>
-            <a:r>
-              <a:rPr lang="en-US" baseline="0" dirty="0" err="1" smtClean="0"/>
-              <a:t>besser</a:t>
-            </a:r>
-            <a:r>
-              <a:rPr lang="en-US" baseline="0" dirty="0" smtClean="0"/>
-              <a:t> </a:t>
-            </a:r>
-            <a:r>
-              <a:rPr lang="en-US" baseline="0" dirty="0" err="1" smtClean="0"/>
-              <a:t>gekleidet</a:t>
-            </a:r>
-            <a:r>
-              <a:rPr lang="en-US" baseline="0" dirty="0" smtClean="0"/>
-              <a:t> und </a:t>
-            </a:r>
-            <a:r>
-              <a:rPr lang="en-US" baseline="0" dirty="0" err="1" smtClean="0"/>
-              <a:t>wir</a:t>
-            </a:r>
-            <a:r>
-              <a:rPr lang="en-US" baseline="0" dirty="0" smtClean="0"/>
-              <a:t> </a:t>
-            </a:r>
-            <a:r>
-              <a:rPr lang="en-US" baseline="0" dirty="0" err="1" smtClean="0"/>
-              <a:t>werden</a:t>
-            </a:r>
-            <a:r>
-              <a:rPr lang="en-US" baseline="0" dirty="0" smtClean="0"/>
-              <a:t> </a:t>
-            </a:r>
-            <a:r>
-              <a:rPr lang="en-US" baseline="0" dirty="0" err="1" smtClean="0"/>
-              <a:t>vermutlich</a:t>
-            </a:r>
-            <a:r>
-              <a:rPr lang="en-US" baseline="0" dirty="0" smtClean="0"/>
-              <a:t> </a:t>
-            </a:r>
-            <a:r>
-              <a:rPr lang="en-US" baseline="0" dirty="0" err="1" smtClean="0"/>
-              <a:t>auch</a:t>
-            </a:r>
-            <a:r>
-              <a:rPr lang="en-US" baseline="0" dirty="0" smtClean="0"/>
-              <a:t> </a:t>
-            </a:r>
-            <a:r>
-              <a:rPr lang="en-US" baseline="0" dirty="0" err="1" smtClean="0"/>
-              <a:t>noch</a:t>
-            </a:r>
-            <a:r>
-              <a:rPr lang="en-US" baseline="0" dirty="0" smtClean="0"/>
-              <a:t> </a:t>
-            </a:r>
-            <a:r>
-              <a:rPr lang="en-US" baseline="0" dirty="0" err="1" smtClean="0"/>
-              <a:t>einmal</a:t>
-            </a:r>
-            <a:r>
-              <a:rPr lang="en-US" baseline="0" dirty="0" smtClean="0"/>
-              <a:t> die </a:t>
-            </a:r>
-            <a:r>
-              <a:rPr lang="en-US" baseline="0" dirty="0" err="1" smtClean="0"/>
-              <a:t>Lichtverhaeltnisse</a:t>
-            </a:r>
-            <a:r>
-              <a:rPr lang="en-US" baseline="0" dirty="0" smtClean="0"/>
-              <a:t> </a:t>
-            </a:r>
-            <a:r>
-              <a:rPr lang="en-US" baseline="0" dirty="0" err="1" smtClean="0"/>
-              <a:t>ein</a:t>
-            </a:r>
-            <a:r>
-              <a:rPr lang="en-US" baseline="0" dirty="0" smtClean="0"/>
-              <a:t> </a:t>
-            </a:r>
-            <a:r>
-              <a:rPr lang="en-US" baseline="0" dirty="0" err="1" smtClean="0"/>
-              <a:t>wenig</a:t>
-            </a:r>
-            <a:r>
-              <a:rPr lang="en-US" baseline="0" dirty="0" smtClean="0"/>
-              <a:t> </a:t>
-            </a:r>
-            <a:r>
-              <a:rPr lang="en-US" baseline="0" dirty="0" err="1" smtClean="0"/>
-              <a:t>ueberarbeiten</a:t>
-            </a:r>
-            <a:r>
-              <a:rPr lang="en-US" baseline="0" dirty="0" smtClean="0"/>
+              <a:t>samt</a:t>
+            </a:r>
+            <a:r>
+              <a:rPr lang="en-US" baseline="0" dirty="0" smtClean="0"/>
+              <a:t> des </a:t>
+            </a:r>
+            <a:r>
+              <a:rPr lang="en-US" baseline="0" dirty="0" err="1" smtClean="0"/>
+              <a:t>dazugehoerigen</a:t>
+            </a:r>
+            <a:r>
+              <a:rPr lang="en-US" baseline="0" dirty="0" smtClean="0"/>
+              <a:t> Mini-Spiels </a:t>
+            </a:r>
+            <a:r>
+              <a:rPr lang="en-US" baseline="0" dirty="0" err="1" smtClean="0"/>
+              <a:t>praesentieren</a:t>
+            </a:r>
+            <a:r>
+              <a:rPr lang="en-US" baseline="0" smtClean="0"/>
               <a:t>.</a:t>
-            </a:r>
-            <a:br>
-              <a:rPr lang="en-US" baseline="0" dirty="0" smtClean="0"/>
-            </a:br>
-            <a:r>
-              <a:rPr lang="en-US" baseline="0" dirty="0" err="1" smtClean="0"/>
-              <a:t>Es</a:t>
-            </a:r>
-            <a:r>
-              <a:rPr lang="en-US" baseline="0" dirty="0" smtClean="0"/>
-              <a:t> </a:t>
-            </a:r>
-            <a:r>
-              <a:rPr lang="en-US" baseline="0" dirty="0" err="1" smtClean="0"/>
-              <a:t>wird</a:t>
-            </a:r>
-            <a:r>
-              <a:rPr lang="en-US" baseline="0" dirty="0" smtClean="0"/>
-              <a:t> </a:t>
-            </a:r>
-            <a:r>
-              <a:rPr lang="en-US" baseline="0" dirty="0" err="1" smtClean="0"/>
-              <a:t>einen</a:t>
-            </a:r>
-            <a:r>
-              <a:rPr lang="en-US" baseline="0" dirty="0" smtClean="0"/>
-              <a:t> Tutorial-</a:t>
-            </a:r>
-            <a:r>
-              <a:rPr lang="en-US" baseline="0" dirty="0" err="1" smtClean="0"/>
-              <a:t>Raum</a:t>
-            </a:r>
-            <a:r>
-              <a:rPr lang="en-US" baseline="0" dirty="0" smtClean="0"/>
-              <a:t> </a:t>
-            </a:r>
-            <a:r>
-              <a:rPr lang="en-US" baseline="0" dirty="0" err="1" smtClean="0"/>
-              <a:t>geben</a:t>
-            </a:r>
-            <a:r>
-              <a:rPr lang="en-US" baseline="0" dirty="0" smtClean="0"/>
-              <a:t>, von </a:t>
-            </a:r>
-            <a:r>
-              <a:rPr lang="en-US" baseline="0" dirty="0" err="1" smtClean="0"/>
-              <a:t>dem</a:t>
-            </a:r>
-            <a:r>
-              <a:rPr lang="en-US" baseline="0" dirty="0" smtClean="0"/>
-              <a:t> </a:t>
-            </a:r>
-            <a:r>
-              <a:rPr lang="en-US" baseline="0" dirty="0" err="1" smtClean="0"/>
-              <a:t>aus</a:t>
-            </a:r>
-            <a:r>
-              <a:rPr lang="en-US" baseline="0" dirty="0" smtClean="0"/>
-              <a:t> man </a:t>
-            </a:r>
-            <a:r>
-              <a:rPr lang="en-US" baseline="0" dirty="0" err="1" smtClean="0"/>
-              <a:t>dann</a:t>
-            </a:r>
-            <a:r>
-              <a:rPr lang="en-US" baseline="0" dirty="0" smtClean="0"/>
-              <a:t> </a:t>
-            </a:r>
-            <a:r>
-              <a:rPr lang="en-US" baseline="0" dirty="0" err="1" smtClean="0"/>
-              <a:t>fliessend</a:t>
-            </a:r>
-            <a:r>
-              <a:rPr lang="en-US" baseline="0" dirty="0" smtClean="0"/>
-              <a:t> ins Spiel </a:t>
-            </a:r>
-            <a:r>
-              <a:rPr lang="en-US" baseline="0" dirty="0" err="1" smtClean="0"/>
-              <a:t>uebergeht</a:t>
-            </a:r>
-            <a:r>
-              <a:rPr lang="en-US" baseline="0" dirty="0" smtClean="0"/>
-              <a:t> und </a:t>
-            </a:r>
-            <a:r>
-              <a:rPr lang="en-US" baseline="0" dirty="0" err="1" smtClean="0"/>
-              <a:t>natuerlich</a:t>
-            </a:r>
-            <a:r>
-              <a:rPr lang="en-US" baseline="0" dirty="0" smtClean="0"/>
-              <a:t> </a:t>
-            </a:r>
-            <a:r>
-              <a:rPr lang="en-US" baseline="0" dirty="0" err="1" smtClean="0"/>
-              <a:t>gibt</a:t>
-            </a:r>
-            <a:r>
-              <a:rPr lang="en-US" baseline="0" dirty="0" smtClean="0"/>
-              <a:t> </a:t>
-            </a:r>
-            <a:r>
-              <a:rPr lang="en-US" baseline="0" dirty="0" err="1" smtClean="0"/>
-              <a:t>es</a:t>
-            </a:r>
-            <a:r>
-              <a:rPr lang="en-US" baseline="0" dirty="0" smtClean="0"/>
-              <a:t> </a:t>
-            </a:r>
-            <a:r>
-              <a:rPr lang="en-US" baseline="0" dirty="0" err="1" smtClean="0"/>
-              <a:t>dann</a:t>
-            </a:r>
-            <a:r>
-              <a:rPr lang="en-US" baseline="0" dirty="0" smtClean="0"/>
-              <a:t> </a:t>
-            </a:r>
-            <a:r>
-              <a:rPr lang="en-US" baseline="0" dirty="0" err="1" smtClean="0"/>
-              <a:t>auch</a:t>
-            </a:r>
-            <a:r>
-              <a:rPr lang="en-US" baseline="0" dirty="0" smtClean="0"/>
-              <a:t> </a:t>
-            </a:r>
-            <a:r>
-              <a:rPr lang="en-US" baseline="0" dirty="0" err="1" smtClean="0"/>
-              <a:t>ein</a:t>
-            </a:r>
-            <a:r>
-              <a:rPr lang="en-US" baseline="0" dirty="0" smtClean="0"/>
-              <a:t> </a:t>
-            </a:r>
-            <a:r>
-              <a:rPr lang="en-US" baseline="0" dirty="0" err="1" smtClean="0"/>
-              <a:t>entsprechendes</a:t>
-            </a:r>
-            <a:r>
-              <a:rPr lang="en-US" baseline="0" dirty="0" smtClean="0"/>
-              <a:t> </a:t>
-            </a:r>
-            <a:r>
-              <a:rPr lang="en-US" baseline="0" dirty="0" err="1" smtClean="0"/>
-              <a:t>Menue</a:t>
-            </a:r>
-            <a:r>
-              <a:rPr lang="en-US" baseline="0" dirty="0" smtClean="0"/>
-              <a:t>. </a:t>
-            </a:r>
-            <a:br>
-              <a:rPr lang="en-US" baseline="0" dirty="0" smtClean="0"/>
-            </a:br>
-            <a:r>
-              <a:rPr lang="en-US" baseline="0" dirty="0" smtClean="0"/>
-              <a:t/>
-            </a:r>
-            <a:br>
-              <a:rPr lang="en-US" baseline="0" dirty="0" smtClean="0"/>
-            </a:br>
-            <a:r>
-              <a:rPr lang="en-US" baseline="0" dirty="0" smtClean="0"/>
-              <a:t>So, </a:t>
-            </a:r>
-            <a:r>
-              <a:rPr lang="en-US" baseline="0" dirty="0" err="1" smtClean="0"/>
-              <a:t>dann</a:t>
-            </a:r>
-            <a:r>
-              <a:rPr lang="en-US" baseline="0" dirty="0" smtClean="0"/>
-              <a:t> </a:t>
-            </a:r>
-            <a:r>
-              <a:rPr lang="en-US" baseline="0" dirty="0" err="1" smtClean="0"/>
-              <a:t>kommen</a:t>
-            </a:r>
-            <a:r>
-              <a:rPr lang="en-US" baseline="0" dirty="0" smtClean="0"/>
-              <a:t> </a:t>
-            </a:r>
-            <a:r>
-              <a:rPr lang="en-US" baseline="0" dirty="0" err="1" smtClean="0"/>
-              <a:t>wir</a:t>
-            </a:r>
-            <a:r>
-              <a:rPr lang="en-US" baseline="0" dirty="0" smtClean="0"/>
-              <a:t> </a:t>
-            </a:r>
-            <a:r>
-              <a:rPr lang="en-US" baseline="0" dirty="0" err="1" smtClean="0"/>
-              <a:t>aber</a:t>
-            </a:r>
-            <a:r>
-              <a:rPr lang="en-US" baseline="0" dirty="0" smtClean="0"/>
-              <a:t> </a:t>
-            </a:r>
-            <a:r>
-              <a:rPr lang="en-US" baseline="0" dirty="0" err="1" smtClean="0"/>
-              <a:t>endlich</a:t>
-            </a:r>
-            <a:r>
-              <a:rPr lang="en-US" baseline="0" dirty="0" smtClean="0"/>
-              <a:t> </a:t>
-            </a:r>
-            <a:r>
-              <a:rPr lang="en-US" baseline="0" dirty="0" err="1" smtClean="0"/>
-              <a:t>zum</a:t>
-            </a:r>
-            <a:r>
-              <a:rPr lang="en-US" baseline="0" dirty="0" smtClean="0"/>
-              <a:t> Spiel </a:t>
-            </a:r>
-            <a:r>
-              <a:rPr lang="en-US" baseline="0" dirty="0" err="1" smtClean="0"/>
-              <a:t>selbst</a:t>
-            </a:r>
-            <a:r>
-              <a:rPr lang="en-US" baseline="0" dirty="0" smtClean="0"/>
-              <a:t>. </a:t>
-            </a:r>
-            <a:r>
-              <a:rPr lang="en-US" baseline="0" smtClean="0">
-                <a:sym typeface="Wingdings" panose="05000000000000000000" pitchFamily="2" charset="2"/>
-              </a:rPr>
-              <a:t></a:t>
             </a:r>
             <a:endParaRPr lang="de-DE" dirty="0"/>
           </a:p>
@@ -3326,7 +2504,7 @@
           <a:p>
             <a:fld id="{1DC63592-9D31-432D-A510-4EFC698F70CA}" type="datetimeFigureOut">
               <a:rPr lang="de-DE" smtClean="0"/>
-              <a:t>05.07.2018</a:t>
+              <a:t>04.07.2018</a:t>
             </a:fld>
             <a:endParaRPr lang="de-DE"/>
           </a:p>
@@ -3613,7 +2791,7 @@
           <a:p>
             <a:fld id="{1DC63592-9D31-432D-A510-4EFC698F70CA}" type="datetimeFigureOut">
               <a:rPr lang="de-DE" smtClean="0"/>
-              <a:t>05.07.2018</a:t>
+              <a:t>04.07.2018</a:t>
             </a:fld>
             <a:endParaRPr lang="de-DE"/>
           </a:p>
@@ -3805,7 +2983,7 @@
           <a:p>
             <a:fld id="{1DC63592-9D31-432D-A510-4EFC698F70CA}" type="datetimeFigureOut">
               <a:rPr lang="de-DE" smtClean="0"/>
-              <a:t>05.07.2018</a:t>
+              <a:t>04.07.2018</a:t>
             </a:fld>
             <a:endParaRPr lang="de-DE"/>
           </a:p>
@@ -4066,7 +3244,7 @@
           <a:p>
             <a:fld id="{1DC63592-9D31-432D-A510-4EFC698F70CA}" type="datetimeFigureOut">
               <a:rPr lang="de-DE" smtClean="0"/>
-              <a:t>05.07.2018</a:t>
+              <a:t>04.07.2018</a:t>
             </a:fld>
             <a:endParaRPr lang="de-DE"/>
           </a:p>
@@ -4490,7 +3668,7 @@
           <a:p>
             <a:fld id="{1DC63592-9D31-432D-A510-4EFC698F70CA}" type="datetimeFigureOut">
               <a:rPr lang="de-DE" smtClean="0"/>
-              <a:t>05.07.2018</a:t>
+              <a:t>04.07.2018</a:t>
             </a:fld>
             <a:endParaRPr lang="de-DE"/>
           </a:p>
@@ -5036,7 +4214,7 @@
           <a:p>
             <a:fld id="{1DC63592-9D31-432D-A510-4EFC698F70CA}" type="datetimeFigureOut">
               <a:rPr lang="de-DE" smtClean="0"/>
-              <a:t>05.07.2018</a:t>
+              <a:t>04.07.2018</a:t>
             </a:fld>
             <a:endParaRPr lang="de-DE"/>
           </a:p>
@@ -5876,7 +5054,7 @@
           <a:p>
             <a:fld id="{1DC63592-9D31-432D-A510-4EFC698F70CA}" type="datetimeFigureOut">
               <a:rPr lang="de-DE" smtClean="0"/>
-              <a:t>05.07.2018</a:t>
+              <a:t>04.07.2018</a:t>
             </a:fld>
             <a:endParaRPr lang="de-DE"/>
           </a:p>
@@ -6046,7 +5224,7 @@
           <a:p>
             <a:fld id="{1DC63592-9D31-432D-A510-4EFC698F70CA}" type="datetimeFigureOut">
               <a:rPr lang="de-DE" smtClean="0"/>
-              <a:t>05.07.2018</a:t>
+              <a:t>04.07.2018</a:t>
             </a:fld>
             <a:endParaRPr lang="de-DE"/>
           </a:p>
@@ -6230,7 +5408,7 @@
           <a:p>
             <a:fld id="{1DC63592-9D31-432D-A510-4EFC698F70CA}" type="datetimeFigureOut">
               <a:rPr lang="de-DE" smtClean="0"/>
-              <a:t>05.07.2018</a:t>
+              <a:t>04.07.2018</a:t>
             </a:fld>
             <a:endParaRPr lang="de-DE"/>
           </a:p>
@@ -6400,7 +5578,7 @@
           <a:p>
             <a:fld id="{1DC63592-9D31-432D-A510-4EFC698F70CA}" type="datetimeFigureOut">
               <a:rPr lang="de-DE" smtClean="0"/>
-              <a:t>05.07.2018</a:t>
+              <a:t>04.07.2018</a:t>
             </a:fld>
             <a:endParaRPr lang="de-DE"/>
           </a:p>
@@ -6648,7 +5826,7 @@
           <a:p>
             <a:fld id="{1DC63592-9D31-432D-A510-4EFC698F70CA}" type="datetimeFigureOut">
               <a:rPr lang="de-DE" smtClean="0"/>
-              <a:t>05.07.2018</a:t>
+              <a:t>04.07.2018</a:t>
             </a:fld>
             <a:endParaRPr lang="de-DE"/>
           </a:p>
@@ -6885,7 +6063,7 @@
           <a:p>
             <a:fld id="{1DC63592-9D31-432D-A510-4EFC698F70CA}" type="datetimeFigureOut">
               <a:rPr lang="de-DE" smtClean="0"/>
-              <a:t>05.07.2018</a:t>
+              <a:t>04.07.2018</a:t>
             </a:fld>
             <a:endParaRPr lang="de-DE"/>
           </a:p>
@@ -7263,7 +6441,7 @@
           <a:p>
             <a:fld id="{1DC63592-9D31-432D-A510-4EFC698F70CA}" type="datetimeFigureOut">
               <a:rPr lang="de-DE" smtClean="0"/>
-              <a:t>05.07.2018</a:t>
+              <a:t>04.07.2018</a:t>
             </a:fld>
             <a:endParaRPr lang="de-DE"/>
           </a:p>
@@ -7386,7 +6564,7 @@
           <a:p>
             <a:fld id="{1DC63592-9D31-432D-A510-4EFC698F70CA}" type="datetimeFigureOut">
               <a:rPr lang="de-DE" smtClean="0"/>
-              <a:t>05.07.2018</a:t>
+              <a:t>04.07.2018</a:t>
             </a:fld>
             <a:endParaRPr lang="de-DE"/>
           </a:p>
@@ -7481,7 +6659,7 @@
           <a:p>
             <a:fld id="{1DC63592-9D31-432D-A510-4EFC698F70CA}" type="datetimeFigureOut">
               <a:rPr lang="de-DE" smtClean="0"/>
-              <a:t>05.07.2018</a:t>
+              <a:t>04.07.2018</a:t>
             </a:fld>
             <a:endParaRPr lang="de-DE"/>
           </a:p>
@@ -7732,7 +6910,7 @@
           <a:p>
             <a:fld id="{1DC63592-9D31-432D-A510-4EFC698F70CA}" type="datetimeFigureOut">
               <a:rPr lang="de-DE" smtClean="0"/>
-              <a:t>05.07.2018</a:t>
+              <a:t>04.07.2018</a:t>
             </a:fld>
             <a:endParaRPr lang="de-DE"/>
           </a:p>
@@ -8024,7 +7202,7 @@
           <a:p>
             <a:fld id="{1DC63592-9D31-432D-A510-4EFC698F70CA}" type="datetimeFigureOut">
               <a:rPr lang="de-DE" smtClean="0"/>
-              <a:t>05.07.2018</a:t>
+              <a:t>04.07.2018</a:t>
             </a:fld>
             <a:endParaRPr lang="de-DE"/>
           </a:p>
@@ -8237,7 +7415,7 @@
           <a:p>
             <a:fld id="{1DC63592-9D31-432D-A510-4EFC698F70CA}" type="datetimeFigureOut">
               <a:rPr lang="de-DE" smtClean="0"/>
-              <a:t>05.07.2018</a:t>
+              <a:t>04.07.2018</a:t>
             </a:fld>
             <a:endParaRPr lang="de-DE"/>
           </a:p>
@@ -9107,7 +8285,7 @@
         </p:blipFill>
         <p:spPr>
           <a:xfrm rot="21420000" flipH="1">
-            <a:off x="377700" y="-23824"/>
+            <a:off x="-333343" y="120192"/>
             <a:ext cx="11096441" cy="8209621"/>
           </a:xfrm>
           <a:prstGeom prst="rect">
@@ -9115,36 +8293,6 @@
           </a:prstGeom>
         </p:spPr>
       </p:pic>
-      <p:sp>
-        <p:nvSpPr>
-          <p:cNvPr id="4" name="Textfeld 3"/>
-          <p:cNvSpPr txBox="1"/>
-          <p:nvPr/>
-        </p:nvSpPr>
-        <p:spPr>
-          <a:xfrm>
-            <a:off x="3131840" y="2123962"/>
-            <a:ext cx="2928967" cy="369332"/>
-          </a:xfrm>
-          <a:prstGeom prst="rect">
-            <a:avLst/>
-          </a:prstGeom>
-          <a:noFill/>
-        </p:spPr>
-        <p:txBody>
-          <a:bodyPr wrap="square" rtlCol="0">
-            <a:spAutoFit/>
-          </a:bodyPr>
-          <a:lstStyle/>
-          <a:p>
-            <a:r>
-              <a:rPr lang="en-US" dirty="0" smtClean="0"/>
-              <a:t>Formerly “Voodoo”</a:t>
-            </a:r>
-            <a:endParaRPr lang="de-DE" dirty="0"/>
-          </a:p>
-        </p:txBody>
-      </p:sp>
     </p:spTree>
     <p:extLst>
       <p:ext uri="{BB962C8B-B14F-4D97-AF65-F5344CB8AC3E}">
@@ -9223,58 +8371,14 @@
                             </p:stCondLst>
                             <p:childTnLst>
                               <p:par>
-                                <p:cTn id="9" presetID="22" presetClass="entr" presetSubtype="8" fill="hold" grpId="0" nodeType="afterEffect">
-                                  <p:stCondLst>
-                                    <p:cond delay="250"/>
-                                  </p:stCondLst>
-                                  <p:childTnLst>
-                                    <p:set>
-                                      <p:cBhvr>
-                                        <p:cTn id="10" dur="1" fill="hold">
-                                          <p:stCondLst>
-                                            <p:cond delay="0"/>
-                                          </p:stCondLst>
-                                        </p:cTn>
-                                        <p:tgtEl>
-                                          <p:spTgt spid="4"/>
-                                        </p:tgtEl>
-                                        <p:attrNameLst>
-                                          <p:attrName>style.visibility</p:attrName>
-                                        </p:attrNameLst>
-                                      </p:cBhvr>
-                                      <p:to>
-                                        <p:strVal val="visible"/>
-                                      </p:to>
-                                    </p:set>
-                                    <p:animEffect transition="in" filter="wipe(left)">
-                                      <p:cBhvr>
-                                        <p:cTn id="11" dur="500"/>
-                                        <p:tgtEl>
-                                          <p:spTgt spid="4"/>
-                                        </p:tgtEl>
-                                      </p:cBhvr>
-                                    </p:animEffect>
-                                  </p:childTnLst>
-                                </p:cTn>
-                              </p:par>
-                            </p:childTnLst>
-                          </p:cTn>
-                        </p:par>
-                        <p:par>
-                          <p:cTn id="12" fill="hold">
-                            <p:stCondLst>
-                              <p:cond delay="2750"/>
-                            </p:stCondLst>
-                            <p:childTnLst>
-                              <p:par>
-                                <p:cTn id="13" presetID="10" presetClass="entr" presetSubtype="0" fill="hold" nodeType="afterEffect">
+                                <p:cTn id="9" presetID="10" presetClass="entr" presetSubtype="0" fill="hold" nodeType="afterEffect">
                                   <p:stCondLst>
                                     <p:cond delay="0"/>
                                   </p:stCondLst>
                                   <p:childTnLst>
                                     <p:set>
                                       <p:cBhvr>
-                                        <p:cTn id="14" dur="1" fill="hold">
+                                        <p:cTn id="10" dur="1" fill="hold">
                                           <p:stCondLst>
                                             <p:cond delay="0"/>
                                           </p:stCondLst>
@@ -9292,7 +8396,7 @@
                                     </p:set>
                                     <p:animEffect transition="in" filter="fade">
                                       <p:cBhvr>
-                                        <p:cTn id="15" dur="500"/>
+                                        <p:cTn id="11" dur="500"/>
                                         <p:tgtEl>
                                           <p:spTgt spid="12"/>
                                         </p:tgtEl>
@@ -9305,20 +8409,20 @@
                           </p:cTn>
                         </p:par>
                         <p:par>
-                          <p:cTn id="16" fill="hold">
+                          <p:cTn id="12" fill="hold">
                             <p:stCondLst>
-                              <p:cond delay="3250"/>
+                              <p:cond delay="2500"/>
                             </p:stCondLst>
                             <p:childTnLst>
                               <p:par>
-                                <p:cTn id="17" presetID="14" presetClass="entr" presetSubtype="5" fill="hold" nodeType="afterEffect">
+                                <p:cTn id="13" presetID="14" presetClass="entr" presetSubtype="5" fill="hold" nodeType="afterEffect">
                                   <p:stCondLst>
                                     <p:cond delay="500"/>
                                   </p:stCondLst>
                                   <p:childTnLst>
                                     <p:set>
                                       <p:cBhvr>
-                                        <p:cTn id="18" dur="1" fill="hold">
+                                        <p:cTn id="14" dur="1" fill="hold">
                                           <p:stCondLst>
                                             <p:cond delay="0"/>
                                           </p:stCondLst>
@@ -9336,7 +8440,7 @@
                                     </p:set>
                                     <p:animEffect transition="in" filter="randombar(vertical)">
                                       <p:cBhvr>
-                                        <p:cTn id="19" dur="500"/>
+                                        <p:cTn id="15" dur="500"/>
                                         <p:tgtEl>
                                           <p:spTgt spid="3"/>
                                         </p:tgtEl>
@@ -9346,14 +8450,14 @@
                                 </p:cTn>
                               </p:par>
                               <p:par>
-                                <p:cTn id="20" presetID="53" presetClass="entr" presetSubtype="16" fill="hold" nodeType="withEffect">
+                                <p:cTn id="16" presetID="53" presetClass="entr" presetSubtype="16" fill="hold" nodeType="withEffect">
                                   <p:stCondLst>
                                     <p:cond delay="500"/>
                                   </p:stCondLst>
                                   <p:childTnLst>
                                     <p:set>
                                       <p:cBhvr>
-                                        <p:cTn id="21" dur="1" fill="hold">
+                                        <p:cTn id="17" dur="1" fill="hold">
                                           <p:stCondLst>
                                             <p:cond delay="0"/>
                                           </p:stCondLst>
@@ -9371,7 +8475,7 @@
                                     </p:set>
                                     <p:anim calcmode="lin" valueType="num">
                                       <p:cBhvr>
-                                        <p:cTn id="22" dur="2000" fill="hold"/>
+                                        <p:cTn id="18" dur="2000" fill="hold"/>
                                         <p:tgtEl>
                                           <p:spTgt spid="15"/>
                                         </p:tgtEl>
@@ -9394,7 +8498,7 @@
                                     </p:anim>
                                     <p:anim calcmode="lin" valueType="num">
                                       <p:cBhvr>
-                                        <p:cTn id="23" dur="2000" fill="hold"/>
+                                        <p:cTn id="19" dur="2000" fill="hold"/>
                                         <p:tgtEl>
                                           <p:spTgt spid="15"/>
                                         </p:tgtEl>
@@ -9417,7 +8521,7 @@
                                     </p:anim>
                                     <p:animEffect transition="in" filter="fade">
                                       <p:cBhvr>
-                                        <p:cTn id="24" dur="2000"/>
+                                        <p:cTn id="20" dur="2000"/>
                                         <p:tgtEl>
                                           <p:spTgt spid="15"/>
                                         </p:tgtEl>
@@ -9430,20 +8534,20 @@
                           </p:cTn>
                         </p:par>
                         <p:par>
-                          <p:cTn id="25" fill="hold">
+                          <p:cTn id="21" fill="hold">
                             <p:stCondLst>
-                              <p:cond delay="5750"/>
+                              <p:cond delay="5000"/>
                             </p:stCondLst>
                             <p:childTnLst>
                               <p:par>
-                                <p:cTn id="26" presetID="16" presetClass="entr" presetSubtype="42" fill="hold" nodeType="afterEffect">
+                                <p:cTn id="22" presetID="16" presetClass="entr" presetSubtype="42" fill="hold" nodeType="afterEffect">
                                   <p:stCondLst>
                                     <p:cond delay="0"/>
                                   </p:stCondLst>
                                   <p:childTnLst>
                                     <p:set>
                                       <p:cBhvr>
-                                        <p:cTn id="27" dur="1" fill="hold">
+                                        <p:cTn id="23" dur="1" fill="hold">
                                           <p:stCondLst>
                                             <p:cond delay="0"/>
                                           </p:stCondLst>
@@ -9461,7 +8565,7 @@
                                     </p:set>
                                     <p:animEffect transition="in" filter="barn(outHorizontal)">
                                       <p:cBhvr>
-                                        <p:cTn id="28" dur="500"/>
+                                        <p:cTn id="24" dur="500"/>
                                         <p:tgtEl>
                                           <p:spTgt spid="17"/>
                                         </p:tgtEl>
@@ -9474,20 +8578,20 @@
                           </p:cTn>
                         </p:par>
                         <p:par>
-                          <p:cTn id="29" fill="hold">
+                          <p:cTn id="25" fill="hold">
                             <p:stCondLst>
-                              <p:cond delay="6250"/>
+                              <p:cond delay="5500"/>
                             </p:stCondLst>
                             <p:childTnLst>
                               <p:par>
-                                <p:cTn id="30" presetID="47" presetClass="entr" presetSubtype="0" fill="hold" nodeType="afterEffect">
+                                <p:cTn id="26" presetID="47" presetClass="entr" presetSubtype="0" fill="hold" nodeType="afterEffect">
                                   <p:stCondLst>
                                     <p:cond delay="1250"/>
                                   </p:stCondLst>
                                   <p:childTnLst>
                                     <p:set>
                                       <p:cBhvr>
-                                        <p:cTn id="31" dur="1" fill="hold">
+                                        <p:cTn id="27" dur="1" fill="hold">
                                           <p:stCondLst>
                                             <p:cond delay="0"/>
                                           </p:stCondLst>
@@ -9505,7 +8609,7 @@
                                     </p:set>
                                     <p:animEffect transition="in" filter="fade">
                                       <p:cBhvr>
-                                        <p:cTn id="32" dur="1000"/>
+                                        <p:cTn id="28" dur="1000"/>
                                         <p:tgtEl>
                                           <p:spTgt spid="18"/>
                                         </p:tgtEl>
@@ -9513,7 +8617,7 @@
                                     </p:animEffect>
                                     <p:anim calcmode="lin" valueType="num">
                                       <p:cBhvr>
-                                        <p:cTn id="33" dur="1000" fill="hold"/>
+                                        <p:cTn id="29" dur="1000" fill="hold"/>
                                         <p:tgtEl>
                                           <p:spTgt spid="18"/>
                                         </p:tgtEl>
@@ -9536,7 +8640,7 @@
                                     </p:anim>
                                     <p:anim calcmode="lin" valueType="num">
                                       <p:cBhvr>
-                                        <p:cTn id="34" dur="1000" fill="hold"/>
+                                        <p:cTn id="30" dur="1000" fill="hold"/>
                                         <p:tgtEl>
                                           <p:spTgt spid="18"/>
                                         </p:tgtEl>
@@ -9561,14 +8665,14 @@
                                 </p:cTn>
                               </p:par>
                               <p:par>
-                                <p:cTn id="35" presetID="10" presetClass="entr" presetSubtype="0" fill="hold" nodeType="withEffect">
+                                <p:cTn id="31" presetID="10" presetClass="entr" presetSubtype="0" fill="hold" nodeType="withEffect">
                                   <p:stCondLst>
                                     <p:cond delay="0"/>
                                   </p:stCondLst>
                                   <p:childTnLst>
                                     <p:set>
                                       <p:cBhvr>
-                                        <p:cTn id="36" dur="1" fill="hold">
+                                        <p:cTn id="32" dur="1" fill="hold">
                                           <p:stCondLst>
                                             <p:cond delay="0"/>
                                           </p:stCondLst>
@@ -9586,7 +8690,7 @@
                                     </p:set>
                                     <p:animEffect transition="in" filter="fade">
                                       <p:cBhvr>
-                                        <p:cTn id="37" dur="500"/>
+                                        <p:cTn id="33" dur="500"/>
                                         <p:tgtEl>
                                           <p:spTgt spid="13"/>
                                         </p:tgtEl>
@@ -9599,20 +8703,20 @@
                           </p:cTn>
                         </p:par>
                         <p:par>
-                          <p:cTn id="38" fill="hold">
+                          <p:cTn id="34" fill="hold">
                             <p:stCondLst>
-                              <p:cond delay="8500"/>
+                              <p:cond delay="7750"/>
                             </p:stCondLst>
                             <p:childTnLst>
                               <p:par>
-                                <p:cTn id="39" presetID="16" presetClass="entr" presetSubtype="21" fill="hold" nodeType="afterEffect">
+                                <p:cTn id="35" presetID="16" presetClass="entr" presetSubtype="21" fill="hold" nodeType="afterEffect">
                                   <p:stCondLst>
                                     <p:cond delay="750"/>
                                   </p:stCondLst>
                                   <p:childTnLst>
                                     <p:set>
                                       <p:cBhvr>
-                                        <p:cTn id="40" dur="1" fill="hold">
+                                        <p:cTn id="36" dur="1" fill="hold">
                                           <p:stCondLst>
                                             <p:cond delay="0"/>
                                           </p:stCondLst>
@@ -9630,7 +8734,7 @@
                                     </p:set>
                                     <p:animEffect transition="in" filter="barn(inVertical)">
                                       <p:cBhvr>
-                                        <p:cTn id="41" dur="500"/>
+                                        <p:cTn id="37" dur="500"/>
                                         <p:tgtEl>
                                           <p:spTgt spid="14"/>
                                         </p:tgtEl>
@@ -9643,20 +8747,20 @@
                           </p:cTn>
                         </p:par>
                         <p:par>
-                          <p:cTn id="42" fill="hold">
+                          <p:cTn id="38" fill="hold">
                             <p:stCondLst>
-                              <p:cond delay="9750"/>
+                              <p:cond delay="9000"/>
                             </p:stCondLst>
                             <p:childTnLst>
                               <p:par>
-                                <p:cTn id="43" presetID="47" presetClass="exit" presetSubtype="0" fill="hold" nodeType="afterEffect">
+                                <p:cTn id="39" presetID="47" presetClass="exit" presetSubtype="0" fill="hold" nodeType="afterEffect">
                                   <p:stCondLst>
                                     <p:cond delay="0"/>
                                   </p:stCondLst>
                                   <p:childTnLst>
                                     <p:animEffect transition="out" filter="fade">
                                       <p:cBhvr>
-                                        <p:cTn id="44" dur="1000"/>
+                                        <p:cTn id="40" dur="1000"/>
                                         <p:tgtEl>
                                           <p:spTgt spid="18"/>
                                         </p:tgtEl>
@@ -9664,7 +8768,7 @@
                                     </p:animEffect>
                                     <p:anim calcmode="lin" valueType="num">
                                       <p:cBhvr>
-                                        <p:cTn id="45" dur="1000"/>
+                                        <p:cTn id="41" dur="1000"/>
                                         <p:tgtEl>
                                           <p:spTgt spid="18"/>
                                         </p:tgtEl>
@@ -9687,7 +8791,7 @@
                                     </p:anim>
                                     <p:anim calcmode="lin" valueType="num">
                                       <p:cBhvr>
-                                        <p:cTn id="46" dur="1000"/>
+                                        <p:cTn id="42" dur="1000"/>
                                         <p:tgtEl>
                                           <p:spTgt spid="18"/>
                                         </p:tgtEl>
@@ -9710,7 +8814,7 @@
                                     </p:anim>
                                     <p:set>
                                       <p:cBhvr>
-                                        <p:cTn id="47" dur="1" fill="hold">
+                                        <p:cTn id="43" dur="1" fill="hold">
                                           <p:stCondLst>
                                             <p:cond delay="999"/>
                                           </p:stCondLst>
@@ -9733,20 +8837,20 @@
                           </p:cTn>
                         </p:par>
                         <p:par>
-                          <p:cTn id="48" fill="hold">
+                          <p:cTn id="44" fill="hold">
                             <p:stCondLst>
-                              <p:cond delay="10750"/>
+                              <p:cond delay="10000"/>
                             </p:stCondLst>
                             <p:childTnLst>
                               <p:par>
-                                <p:cTn id="49" presetID="8" presetClass="entr" presetSubtype="32" fill="hold" nodeType="afterEffect">
+                                <p:cTn id="45" presetID="8" presetClass="entr" presetSubtype="32" fill="hold" nodeType="afterEffect">
                                   <p:stCondLst>
                                     <p:cond delay="0"/>
                                   </p:stCondLst>
                                   <p:childTnLst>
                                     <p:set>
                                       <p:cBhvr>
-                                        <p:cTn id="50" dur="1" fill="hold">
+                                        <p:cTn id="46" dur="1" fill="hold">
                                           <p:stCondLst>
                                             <p:cond delay="0"/>
                                           </p:stCondLst>
@@ -9764,7 +8868,7 @@
                                     </p:set>
                                     <p:animEffect transition="in" filter="diamond(out)">
                                       <p:cBhvr>
-                                        <p:cTn id="51" dur="2000"/>
+                                        <p:cTn id="47" dur="2000"/>
                                         <p:tgtEl>
                                           <p:spTgt spid="16"/>
                                         </p:tgtEl>
@@ -9774,14 +8878,14 @@
                                 </p:cTn>
                               </p:par>
                               <p:par>
-                                <p:cTn id="52" presetID="42" presetClass="entr" presetSubtype="0" fill="hold" nodeType="withEffect">
+                                <p:cTn id="48" presetID="42" presetClass="entr" presetSubtype="0" fill="hold" nodeType="withEffect">
                                   <p:stCondLst>
                                     <p:cond delay="0"/>
                                   </p:stCondLst>
                                   <p:childTnLst>
                                     <p:set>
                                       <p:cBhvr>
-                                        <p:cTn id="53" dur="1" fill="hold">
+                                        <p:cTn id="49" dur="1" fill="hold">
                                           <p:stCondLst>
                                             <p:cond delay="0"/>
                                           </p:stCondLst>
@@ -9799,7 +8903,7 @@
                                     </p:set>
                                     <p:animEffect transition="in" filter="fade">
                                       <p:cBhvr>
-                                        <p:cTn id="54" dur="1000"/>
+                                        <p:cTn id="50" dur="1000"/>
                                         <p:tgtEl>
                                           <p:spTgt spid="19"/>
                                         </p:tgtEl>
@@ -9807,7 +8911,7 @@
                                     </p:animEffect>
                                     <p:anim calcmode="lin" valueType="num">
                                       <p:cBhvr>
-                                        <p:cTn id="55" dur="1000" fill="hold"/>
+                                        <p:cTn id="51" dur="1000" fill="hold"/>
                                         <p:tgtEl>
                                           <p:spTgt spid="19"/>
                                         </p:tgtEl>
@@ -9830,7 +8934,7 @@
                                     </p:anim>
                                     <p:anim calcmode="lin" valueType="num">
                                       <p:cBhvr>
-                                        <p:cTn id="56" dur="1000" fill="hold"/>
+                                        <p:cTn id="52" dur="1000" fill="hold"/>
                                         <p:tgtEl>
                                           <p:spTgt spid="19"/>
                                         </p:tgtEl>
@@ -9883,7 +8987,6 @@
     </p:tnLst>
     <p:bldLst>
       <p:bldP spid="2" grpId="0"/>
-      <p:bldP spid="4" grpId="0"/>
     </p:bldLst>
   </p:timing>
 </p:sld>
@@ -10047,8 +9150,41 @@
                 <a:latin typeface="MV Boli" pitchFamily="2" charset="0"/>
                 <a:cs typeface="MV Boli" pitchFamily="2" charset="0"/>
               </a:rPr>
-              <a:t>Gate 2 Promises vs. Present	</a:t>
-            </a:r>
+              <a:t>Gate 2 </a:t>
+            </a:r>
+            <a:r>
+              <a:rPr lang="en-GB" sz="2400" b="1" dirty="0" smtClean="0">
+                <a:solidFill>
+                  <a:schemeClr val="tx1">
+                    <a:lumMod val="95000"/>
+                  </a:schemeClr>
+                </a:solidFill>
+                <a:latin typeface="MV Boli" pitchFamily="2" charset="0"/>
+                <a:cs typeface="MV Boli" pitchFamily="2" charset="0"/>
+              </a:rPr>
+              <a:t>Promises </a:t>
+            </a:r>
+            <a:r>
+              <a:rPr lang="en-GB" sz="2400" b="1" dirty="0" smtClean="0">
+                <a:solidFill>
+                  <a:schemeClr val="tx1">
+                    <a:lumMod val="95000"/>
+                  </a:schemeClr>
+                </a:solidFill>
+                <a:latin typeface="MV Boli" pitchFamily="2" charset="0"/>
+                <a:cs typeface="MV Boli" pitchFamily="2" charset="0"/>
+              </a:rPr>
+              <a:t>vs. Present	</a:t>
+            </a:r>
+            <a:endParaRPr lang="en-GB" sz="2400" b="1" dirty="0" smtClean="0">
+              <a:solidFill>
+                <a:schemeClr val="tx1">
+                  <a:lumMod val="95000"/>
+                </a:schemeClr>
+              </a:solidFill>
+              <a:latin typeface="MV Boli" pitchFamily="2" charset="0"/>
+              <a:cs typeface="MV Boli" pitchFamily="2" charset="0"/>
+            </a:endParaRPr>
           </a:p>
           <a:p>
             <a:pPr marL="285750" lvl="0" indent="-285750" algn="l">
@@ -10822,14 +9958,7 @@
                 <a:latin typeface="MV Boli" panose="02000500030200090000" pitchFamily="2" charset="0"/>
                 <a:cs typeface="MV Boli" panose="02000500030200090000" pitchFamily="2" charset="0"/>
               </a:rPr>
-              <a:t> </a:t>
-            </a:r>
-            <a:r>
-              <a:rPr lang="en-GB" sz="2400" dirty="0" smtClean="0">
-                <a:latin typeface="MV Boli" panose="02000500030200090000" pitchFamily="2" charset="0"/>
-                <a:cs typeface="MV Boli" panose="02000500030200090000" pitchFamily="2" charset="0"/>
-              </a:rPr>
-              <a:t>Doll 13 </a:t>
+              <a:t> Voodoo </a:t>
             </a:r>
             <a:r>
               <a:rPr lang="en-GB" sz="2400" dirty="0">
@@ -11847,6 +10976,10 @@
               </a:rPr>
               <a:t>+ Basic Sound</a:t>
             </a:r>
+            <a:endParaRPr lang="en-US" sz="1800" dirty="0" smtClean="0">
+              <a:latin typeface="MV Boli" pitchFamily="2" charset="0"/>
+              <a:cs typeface="MV Boli" pitchFamily="2" charset="0"/>
+            </a:endParaRPr>
           </a:p>
         </p:txBody>
       </p:sp>
@@ -12747,6 +11880,10 @@
               </a:rPr>
               <a:t>Polished Game</a:t>
             </a:r>
+            <a:endParaRPr lang="en-US" sz="2000" dirty="0" smtClean="0">
+              <a:latin typeface="MV Boli" pitchFamily="2" charset="0"/>
+              <a:cs typeface="MV Boli" pitchFamily="2" charset="0"/>
+            </a:endParaRPr>
           </a:p>
           <a:p>
             <a:pPr marL="285750" indent="-285750" algn="l">
@@ -12770,6 +11907,10 @@
               </a:rPr>
               <a:t>Tutorial</a:t>
             </a:r>
+            <a:endParaRPr lang="en-US" sz="2000" dirty="0" smtClean="0">
+              <a:latin typeface="MV Boli" pitchFamily="2" charset="0"/>
+              <a:cs typeface="MV Boli" pitchFamily="2" charset="0"/>
+            </a:endParaRPr>
           </a:p>
           <a:p>
             <a:pPr marL="285750" indent="-285750" algn="l">

</xml_diff>